<commit_message>
Added some details about SwingSet3, and Laffy
</commit_message>
<xml_diff>
--- a/Lesson 3.pptx
+++ b/Lesson 3.pptx
@@ -5,7 +5,7 @@
     <p:sldMasterId id="2147483660" r:id="rId1"/>
   </p:sldMasterIdLst>
   <p:notesMasterIdLst>
-    <p:notesMasterId r:id="rId34"/>
+    <p:notesMasterId r:id="rId37"/>
   </p:notesMasterIdLst>
   <p:sldIdLst>
     <p:sldId id="257" r:id="rId2"/>
@@ -30,16 +30,19 @@
     <p:sldId id="276" r:id="rId21"/>
     <p:sldId id="277" r:id="rId22"/>
     <p:sldId id="278" r:id="rId23"/>
-    <p:sldId id="279" r:id="rId24"/>
-    <p:sldId id="287" r:id="rId25"/>
-    <p:sldId id="288" r:id="rId26"/>
-    <p:sldId id="280" r:id="rId27"/>
-    <p:sldId id="281" r:id="rId28"/>
-    <p:sldId id="282" r:id="rId29"/>
-    <p:sldId id="283" r:id="rId30"/>
-    <p:sldId id="284" r:id="rId31"/>
-    <p:sldId id="285" r:id="rId32"/>
-    <p:sldId id="286" r:id="rId33"/>
+    <p:sldId id="289" r:id="rId24"/>
+    <p:sldId id="290" r:id="rId25"/>
+    <p:sldId id="291" r:id="rId26"/>
+    <p:sldId id="279" r:id="rId27"/>
+    <p:sldId id="287" r:id="rId28"/>
+    <p:sldId id="288" r:id="rId29"/>
+    <p:sldId id="280" r:id="rId30"/>
+    <p:sldId id="281" r:id="rId31"/>
+    <p:sldId id="282" r:id="rId32"/>
+    <p:sldId id="283" r:id="rId33"/>
+    <p:sldId id="284" r:id="rId34"/>
+    <p:sldId id="285" r:id="rId35"/>
+    <p:sldId id="286" r:id="rId36"/>
   </p:sldIdLst>
   <p:sldSz cx="9144000" cy="6858000" type="screen4x3"/>
   <p:notesSz cx="6858000" cy="9144000"/>
@@ -141,2738 +144,6 @@
 </p:presentation>
 </file>
 
-<file path=ppt/diagrams/colors1.xml><?xml version="1.0" encoding="utf-8"?>
-<dgm:colorsDef xmlns:dgm="http://schemas.openxmlformats.org/drawingml/2006/diagram" xmlns:a="http://schemas.openxmlformats.org/drawingml/2006/main" uniqueId="urn:microsoft.com/office/officeart/2005/8/colors/accent1_2">
-  <dgm:title val=""/>
-  <dgm:desc val=""/>
-  <dgm:catLst>
-    <dgm:cat type="accent1" pri="11200"/>
-  </dgm:catLst>
-  <dgm:styleLbl name="node0">
-    <dgm:fillClrLst meth="repeat">
-      <a:schemeClr val="accent1"/>
-    </dgm:fillClrLst>
-    <dgm:linClrLst meth="repeat">
-      <a:schemeClr val="lt1"/>
-    </dgm:linClrLst>
-    <dgm:effectClrLst/>
-    <dgm:txLinClrLst/>
-    <dgm:txFillClrLst/>
-    <dgm:txEffectClrLst/>
-  </dgm:styleLbl>
-  <dgm:styleLbl name="alignNode1">
-    <dgm:fillClrLst meth="repeat">
-      <a:schemeClr val="accent1"/>
-    </dgm:fillClrLst>
-    <dgm:linClrLst meth="repeat">
-      <a:schemeClr val="accent1"/>
-    </dgm:linClrLst>
-    <dgm:effectClrLst/>
-    <dgm:txLinClrLst/>
-    <dgm:txFillClrLst/>
-    <dgm:txEffectClrLst/>
-  </dgm:styleLbl>
-  <dgm:styleLbl name="node1">
-    <dgm:fillClrLst meth="repeat">
-      <a:schemeClr val="accent1"/>
-    </dgm:fillClrLst>
-    <dgm:linClrLst meth="repeat">
-      <a:schemeClr val="lt1"/>
-    </dgm:linClrLst>
-    <dgm:effectClrLst/>
-    <dgm:txLinClrLst/>
-    <dgm:txFillClrLst/>
-    <dgm:txEffectClrLst/>
-  </dgm:styleLbl>
-  <dgm:styleLbl name="lnNode1">
-    <dgm:fillClrLst meth="repeat">
-      <a:schemeClr val="accent1"/>
-    </dgm:fillClrLst>
-    <dgm:linClrLst meth="repeat">
-      <a:schemeClr val="lt1"/>
-    </dgm:linClrLst>
-    <dgm:effectClrLst/>
-    <dgm:txLinClrLst/>
-    <dgm:txFillClrLst/>
-    <dgm:txEffectClrLst/>
-  </dgm:styleLbl>
-  <dgm:styleLbl name="vennNode1">
-    <dgm:fillClrLst meth="repeat">
-      <a:schemeClr val="accent1">
-        <a:alpha val="50000"/>
-      </a:schemeClr>
-    </dgm:fillClrLst>
-    <dgm:linClrLst meth="repeat">
-      <a:schemeClr val="lt1"/>
-    </dgm:linClrLst>
-    <dgm:effectClrLst/>
-    <dgm:txLinClrLst/>
-    <dgm:txFillClrLst/>
-    <dgm:txEffectClrLst/>
-  </dgm:styleLbl>
-  <dgm:styleLbl name="node2">
-    <dgm:fillClrLst meth="repeat">
-      <a:schemeClr val="accent1"/>
-    </dgm:fillClrLst>
-    <dgm:linClrLst meth="repeat">
-      <a:schemeClr val="lt1"/>
-    </dgm:linClrLst>
-    <dgm:effectClrLst/>
-    <dgm:txLinClrLst/>
-    <dgm:txFillClrLst/>
-    <dgm:txEffectClrLst/>
-  </dgm:styleLbl>
-  <dgm:styleLbl name="node3">
-    <dgm:fillClrLst meth="repeat">
-      <a:schemeClr val="accent1"/>
-    </dgm:fillClrLst>
-    <dgm:linClrLst meth="repeat">
-      <a:schemeClr val="lt1"/>
-    </dgm:linClrLst>
-    <dgm:effectClrLst/>
-    <dgm:txLinClrLst/>
-    <dgm:txFillClrLst/>
-    <dgm:txEffectClrLst/>
-  </dgm:styleLbl>
-  <dgm:styleLbl name="node4">
-    <dgm:fillClrLst meth="repeat">
-      <a:schemeClr val="accent1"/>
-    </dgm:fillClrLst>
-    <dgm:linClrLst meth="repeat">
-      <a:schemeClr val="lt1"/>
-    </dgm:linClrLst>
-    <dgm:effectClrLst/>
-    <dgm:txLinClrLst/>
-    <dgm:txFillClrLst/>
-    <dgm:txEffectClrLst/>
-  </dgm:styleLbl>
-  <dgm:styleLbl name="fgImgPlace1">
-    <dgm:fillClrLst meth="repeat">
-      <a:schemeClr val="accent1">
-        <a:tint val="50000"/>
-      </a:schemeClr>
-    </dgm:fillClrLst>
-    <dgm:linClrLst meth="repeat">
-      <a:schemeClr val="lt1"/>
-    </dgm:linClrLst>
-    <dgm:effectClrLst/>
-    <dgm:txLinClrLst/>
-    <dgm:txFillClrLst meth="repeat">
-      <a:schemeClr val="lt1"/>
-    </dgm:txFillClrLst>
-    <dgm:txEffectClrLst/>
-  </dgm:styleLbl>
-  <dgm:styleLbl name="alignImgPlace1">
-    <dgm:fillClrLst meth="repeat">
-      <a:schemeClr val="accent1">
-        <a:tint val="50000"/>
-      </a:schemeClr>
-    </dgm:fillClrLst>
-    <dgm:linClrLst meth="repeat">
-      <a:schemeClr val="lt1"/>
-    </dgm:linClrLst>
-    <dgm:effectClrLst/>
-    <dgm:txLinClrLst/>
-    <dgm:txFillClrLst meth="repeat">
-      <a:schemeClr val="lt1"/>
-    </dgm:txFillClrLst>
-    <dgm:txEffectClrLst/>
-  </dgm:styleLbl>
-  <dgm:styleLbl name="bgImgPlace1">
-    <dgm:fillClrLst meth="repeat">
-      <a:schemeClr val="accent1">
-        <a:tint val="50000"/>
-      </a:schemeClr>
-    </dgm:fillClrLst>
-    <dgm:linClrLst meth="repeat">
-      <a:schemeClr val="lt1"/>
-    </dgm:linClrLst>
-    <dgm:effectClrLst/>
-    <dgm:txLinClrLst/>
-    <dgm:txFillClrLst meth="repeat">
-      <a:schemeClr val="lt1"/>
-    </dgm:txFillClrLst>
-    <dgm:txEffectClrLst/>
-  </dgm:styleLbl>
-  <dgm:styleLbl name="sibTrans2D1">
-    <dgm:fillClrLst meth="repeat">
-      <a:schemeClr val="accent1">
-        <a:tint val="60000"/>
-      </a:schemeClr>
-    </dgm:fillClrLst>
-    <dgm:linClrLst meth="repeat">
-      <a:schemeClr val="accent1">
-        <a:tint val="60000"/>
-      </a:schemeClr>
-    </dgm:linClrLst>
-    <dgm:effectClrLst/>
-    <dgm:txLinClrLst/>
-    <dgm:txFillClrLst/>
-    <dgm:txEffectClrLst/>
-  </dgm:styleLbl>
-  <dgm:styleLbl name="fgSibTrans2D1">
-    <dgm:fillClrLst meth="repeat">
-      <a:schemeClr val="accent1">
-        <a:tint val="60000"/>
-      </a:schemeClr>
-    </dgm:fillClrLst>
-    <dgm:linClrLst meth="repeat">
-      <a:schemeClr val="accent1">
-        <a:tint val="60000"/>
-      </a:schemeClr>
-    </dgm:linClrLst>
-    <dgm:effectClrLst/>
-    <dgm:txLinClrLst/>
-    <dgm:txFillClrLst/>
-    <dgm:txEffectClrLst/>
-  </dgm:styleLbl>
-  <dgm:styleLbl name="bgSibTrans2D1">
-    <dgm:fillClrLst meth="repeat">
-      <a:schemeClr val="accent1">
-        <a:tint val="60000"/>
-      </a:schemeClr>
-    </dgm:fillClrLst>
-    <dgm:linClrLst meth="repeat">
-      <a:schemeClr val="accent1">
-        <a:tint val="60000"/>
-      </a:schemeClr>
-    </dgm:linClrLst>
-    <dgm:effectClrLst/>
-    <dgm:txLinClrLst/>
-    <dgm:txFillClrLst/>
-    <dgm:txEffectClrLst/>
-  </dgm:styleLbl>
-  <dgm:styleLbl name="sibTrans1D1">
-    <dgm:fillClrLst meth="repeat">
-      <a:schemeClr val="accent1"/>
-    </dgm:fillClrLst>
-    <dgm:linClrLst meth="repeat">
-      <a:schemeClr val="accent1"/>
-    </dgm:linClrLst>
-    <dgm:effectClrLst/>
-    <dgm:txLinClrLst/>
-    <dgm:txFillClrLst meth="repeat">
-      <a:schemeClr val="tx1"/>
-    </dgm:txFillClrLst>
-    <dgm:txEffectClrLst/>
-  </dgm:styleLbl>
-  <dgm:styleLbl name="callout">
-    <dgm:fillClrLst meth="repeat">
-      <a:schemeClr val="accent1"/>
-    </dgm:fillClrLst>
-    <dgm:linClrLst meth="repeat">
-      <a:schemeClr val="accent1">
-        <a:tint val="50000"/>
-      </a:schemeClr>
-    </dgm:linClrLst>
-    <dgm:effectClrLst/>
-    <dgm:txLinClrLst/>
-    <dgm:txFillClrLst meth="repeat">
-      <a:schemeClr val="tx1"/>
-    </dgm:txFillClrLst>
-    <dgm:txEffectClrLst/>
-  </dgm:styleLbl>
-  <dgm:styleLbl name="asst0">
-    <dgm:fillClrLst meth="repeat">
-      <a:schemeClr val="accent1"/>
-    </dgm:fillClrLst>
-    <dgm:linClrLst meth="repeat">
-      <a:schemeClr val="lt1"/>
-    </dgm:linClrLst>
-    <dgm:effectClrLst/>
-    <dgm:txLinClrLst/>
-    <dgm:txFillClrLst/>
-    <dgm:txEffectClrLst/>
-  </dgm:styleLbl>
-  <dgm:styleLbl name="asst1">
-    <dgm:fillClrLst meth="repeat">
-      <a:schemeClr val="accent1"/>
-    </dgm:fillClrLst>
-    <dgm:linClrLst meth="repeat">
-      <a:schemeClr val="lt1"/>
-    </dgm:linClrLst>
-    <dgm:effectClrLst/>
-    <dgm:txLinClrLst/>
-    <dgm:txFillClrLst/>
-    <dgm:txEffectClrLst/>
-  </dgm:styleLbl>
-  <dgm:styleLbl name="asst2">
-    <dgm:fillClrLst meth="repeat">
-      <a:schemeClr val="accent1"/>
-    </dgm:fillClrLst>
-    <dgm:linClrLst meth="repeat">
-      <a:schemeClr val="lt1"/>
-    </dgm:linClrLst>
-    <dgm:effectClrLst/>
-    <dgm:txLinClrLst/>
-    <dgm:txFillClrLst/>
-    <dgm:txEffectClrLst/>
-  </dgm:styleLbl>
-  <dgm:styleLbl name="asst3">
-    <dgm:fillClrLst meth="repeat">
-      <a:schemeClr val="accent1"/>
-    </dgm:fillClrLst>
-    <dgm:linClrLst meth="repeat">
-      <a:schemeClr val="lt1"/>
-    </dgm:linClrLst>
-    <dgm:effectClrLst/>
-    <dgm:txLinClrLst/>
-    <dgm:txFillClrLst/>
-    <dgm:txEffectClrLst/>
-  </dgm:styleLbl>
-  <dgm:styleLbl name="asst4">
-    <dgm:fillClrLst meth="repeat">
-      <a:schemeClr val="accent1"/>
-    </dgm:fillClrLst>
-    <dgm:linClrLst meth="repeat">
-      <a:schemeClr val="lt1"/>
-    </dgm:linClrLst>
-    <dgm:effectClrLst/>
-    <dgm:txLinClrLst/>
-    <dgm:txFillClrLst/>
-    <dgm:txEffectClrLst/>
-  </dgm:styleLbl>
-  <dgm:styleLbl name="parChTrans2D1">
-    <dgm:fillClrLst meth="repeat">
-      <a:schemeClr val="accent1">
-        <a:tint val="60000"/>
-      </a:schemeClr>
-    </dgm:fillClrLst>
-    <dgm:linClrLst meth="repeat">
-      <a:schemeClr val="accent1">
-        <a:tint val="60000"/>
-      </a:schemeClr>
-    </dgm:linClrLst>
-    <dgm:effectClrLst/>
-    <dgm:txLinClrLst/>
-    <dgm:txFillClrLst meth="repeat">
-      <a:schemeClr val="lt1"/>
-    </dgm:txFillClrLst>
-    <dgm:txEffectClrLst/>
-  </dgm:styleLbl>
-  <dgm:styleLbl name="parChTrans2D2">
-    <dgm:fillClrLst meth="repeat">
-      <a:schemeClr val="accent1"/>
-    </dgm:fillClrLst>
-    <dgm:linClrLst meth="repeat">
-      <a:schemeClr val="accent1"/>
-    </dgm:linClrLst>
-    <dgm:effectClrLst/>
-    <dgm:txLinClrLst/>
-    <dgm:txFillClrLst meth="repeat">
-      <a:schemeClr val="lt1"/>
-    </dgm:txFillClrLst>
-    <dgm:txEffectClrLst/>
-  </dgm:styleLbl>
-  <dgm:styleLbl name="parChTrans2D3">
-    <dgm:fillClrLst meth="repeat">
-      <a:schemeClr val="accent1"/>
-    </dgm:fillClrLst>
-    <dgm:linClrLst meth="repeat">
-      <a:schemeClr val="accent1"/>
-    </dgm:linClrLst>
-    <dgm:effectClrLst/>
-    <dgm:txLinClrLst/>
-    <dgm:txFillClrLst meth="repeat">
-      <a:schemeClr val="lt1"/>
-    </dgm:txFillClrLst>
-    <dgm:txEffectClrLst/>
-  </dgm:styleLbl>
-  <dgm:styleLbl name="parChTrans2D4">
-    <dgm:fillClrLst meth="repeat">
-      <a:schemeClr val="accent1"/>
-    </dgm:fillClrLst>
-    <dgm:linClrLst meth="repeat">
-      <a:schemeClr val="accent1"/>
-    </dgm:linClrLst>
-    <dgm:effectClrLst/>
-    <dgm:txLinClrLst/>
-    <dgm:txFillClrLst meth="repeat">
-      <a:schemeClr val="lt1"/>
-    </dgm:txFillClrLst>
-    <dgm:txEffectClrLst/>
-  </dgm:styleLbl>
-  <dgm:styleLbl name="parChTrans1D1">
-    <dgm:fillClrLst meth="repeat">
-      <a:schemeClr val="accent1"/>
-    </dgm:fillClrLst>
-    <dgm:linClrLst meth="repeat">
-      <a:schemeClr val="accent1">
-        <a:shade val="60000"/>
-      </a:schemeClr>
-    </dgm:linClrLst>
-    <dgm:effectClrLst/>
-    <dgm:txLinClrLst/>
-    <dgm:txFillClrLst meth="repeat">
-      <a:schemeClr val="tx1"/>
-    </dgm:txFillClrLst>
-    <dgm:txEffectClrLst/>
-  </dgm:styleLbl>
-  <dgm:styleLbl name="parChTrans1D2">
-    <dgm:fillClrLst meth="repeat">
-      <a:schemeClr val="accent1"/>
-    </dgm:fillClrLst>
-    <dgm:linClrLst meth="repeat">
-      <a:schemeClr val="accent1">
-        <a:shade val="60000"/>
-      </a:schemeClr>
-    </dgm:linClrLst>
-    <dgm:effectClrLst/>
-    <dgm:txLinClrLst/>
-    <dgm:txFillClrLst meth="repeat">
-      <a:schemeClr val="tx1"/>
-    </dgm:txFillClrLst>
-    <dgm:txEffectClrLst/>
-  </dgm:styleLbl>
-  <dgm:styleLbl name="parChTrans1D3">
-    <dgm:fillClrLst meth="repeat">
-      <a:schemeClr val="accent1"/>
-    </dgm:fillClrLst>
-    <dgm:linClrLst meth="repeat">
-      <a:schemeClr val="accent1">
-        <a:shade val="80000"/>
-      </a:schemeClr>
-    </dgm:linClrLst>
-    <dgm:effectClrLst/>
-    <dgm:txLinClrLst/>
-    <dgm:txFillClrLst meth="repeat">
-      <a:schemeClr val="tx1"/>
-    </dgm:txFillClrLst>
-    <dgm:txEffectClrLst/>
-  </dgm:styleLbl>
-  <dgm:styleLbl name="parChTrans1D4">
-    <dgm:fillClrLst meth="repeat">
-      <a:schemeClr val="accent1"/>
-    </dgm:fillClrLst>
-    <dgm:linClrLst meth="repeat">
-      <a:schemeClr val="accent1">
-        <a:shade val="80000"/>
-      </a:schemeClr>
-    </dgm:linClrLst>
-    <dgm:effectClrLst/>
-    <dgm:txLinClrLst/>
-    <dgm:txFillClrLst meth="repeat">
-      <a:schemeClr val="tx1"/>
-    </dgm:txFillClrLst>
-    <dgm:txEffectClrLst/>
-  </dgm:styleLbl>
-  <dgm:styleLbl name="fgAcc1">
-    <dgm:fillClrLst meth="repeat">
-      <a:schemeClr val="lt1">
-        <a:alpha val="90000"/>
-      </a:schemeClr>
-    </dgm:fillClrLst>
-    <dgm:linClrLst meth="repeat">
-      <a:schemeClr val="accent1"/>
-    </dgm:linClrLst>
-    <dgm:effectClrLst/>
-    <dgm:txLinClrLst/>
-    <dgm:txFillClrLst meth="repeat">
-      <a:schemeClr val="dk1"/>
-    </dgm:txFillClrLst>
-    <dgm:txEffectClrLst/>
-  </dgm:styleLbl>
-  <dgm:styleLbl name="conFgAcc1">
-    <dgm:fillClrLst meth="repeat">
-      <a:schemeClr val="lt1">
-        <a:alpha val="90000"/>
-      </a:schemeClr>
-    </dgm:fillClrLst>
-    <dgm:linClrLst meth="repeat">
-      <a:schemeClr val="accent1"/>
-    </dgm:linClrLst>
-    <dgm:effectClrLst/>
-    <dgm:txLinClrLst/>
-    <dgm:txFillClrLst meth="repeat">
-      <a:schemeClr val="dk1"/>
-    </dgm:txFillClrLst>
-    <dgm:txEffectClrLst/>
-  </dgm:styleLbl>
-  <dgm:styleLbl name="alignAcc1">
-    <dgm:fillClrLst meth="repeat">
-      <a:schemeClr val="lt1">
-        <a:alpha val="90000"/>
-      </a:schemeClr>
-    </dgm:fillClrLst>
-    <dgm:linClrLst meth="repeat">
-      <a:schemeClr val="accent1"/>
-    </dgm:linClrLst>
-    <dgm:effectClrLst/>
-    <dgm:txLinClrLst/>
-    <dgm:txFillClrLst meth="repeat">
-      <a:schemeClr val="dk1"/>
-    </dgm:txFillClrLst>
-    <dgm:txEffectClrLst/>
-  </dgm:styleLbl>
-  <dgm:styleLbl name="trAlignAcc1">
-    <dgm:fillClrLst meth="repeat">
-      <a:schemeClr val="lt1">
-        <a:alpha val="40000"/>
-      </a:schemeClr>
-    </dgm:fillClrLst>
-    <dgm:linClrLst meth="repeat">
-      <a:schemeClr val="accent1"/>
-    </dgm:linClrLst>
-    <dgm:effectClrLst/>
-    <dgm:txLinClrLst/>
-    <dgm:txFillClrLst meth="repeat">
-      <a:schemeClr val="dk1"/>
-    </dgm:txFillClrLst>
-    <dgm:txEffectClrLst/>
-  </dgm:styleLbl>
-  <dgm:styleLbl name="bgAcc1">
-    <dgm:fillClrLst meth="repeat">
-      <a:schemeClr val="lt1">
-        <a:alpha val="90000"/>
-      </a:schemeClr>
-    </dgm:fillClrLst>
-    <dgm:linClrLst meth="repeat">
-      <a:schemeClr val="accent1"/>
-    </dgm:linClrLst>
-    <dgm:effectClrLst/>
-    <dgm:txLinClrLst/>
-    <dgm:txFillClrLst meth="repeat">
-      <a:schemeClr val="dk1"/>
-    </dgm:txFillClrLst>
-    <dgm:txEffectClrLst/>
-  </dgm:styleLbl>
-  <dgm:styleLbl name="solidFgAcc1">
-    <dgm:fillClrLst meth="repeat">
-      <a:schemeClr val="lt1"/>
-    </dgm:fillClrLst>
-    <dgm:linClrLst meth="repeat">
-      <a:schemeClr val="accent1"/>
-    </dgm:linClrLst>
-    <dgm:effectClrLst/>
-    <dgm:txLinClrLst/>
-    <dgm:txFillClrLst meth="repeat">
-      <a:schemeClr val="dk1"/>
-    </dgm:txFillClrLst>
-    <dgm:txEffectClrLst/>
-  </dgm:styleLbl>
-  <dgm:styleLbl name="solidAlignAcc1">
-    <dgm:fillClrLst meth="repeat">
-      <a:schemeClr val="lt1"/>
-    </dgm:fillClrLst>
-    <dgm:linClrLst meth="repeat">
-      <a:schemeClr val="accent1"/>
-    </dgm:linClrLst>
-    <dgm:effectClrLst/>
-    <dgm:txLinClrLst/>
-    <dgm:txFillClrLst meth="repeat">
-      <a:schemeClr val="dk1"/>
-    </dgm:txFillClrLst>
-    <dgm:txEffectClrLst/>
-  </dgm:styleLbl>
-  <dgm:styleLbl name="solidBgAcc1">
-    <dgm:fillClrLst meth="repeat">
-      <a:schemeClr val="lt1"/>
-    </dgm:fillClrLst>
-    <dgm:linClrLst meth="repeat">
-      <a:schemeClr val="accent1"/>
-    </dgm:linClrLst>
-    <dgm:effectClrLst/>
-    <dgm:txLinClrLst/>
-    <dgm:txFillClrLst meth="repeat">
-      <a:schemeClr val="dk1"/>
-    </dgm:txFillClrLst>
-    <dgm:txEffectClrLst/>
-  </dgm:styleLbl>
-  <dgm:styleLbl name="fgAccFollowNode1">
-    <dgm:fillClrLst meth="repeat">
-      <a:schemeClr val="accent1">
-        <a:alpha val="90000"/>
-        <a:tint val="40000"/>
-      </a:schemeClr>
-    </dgm:fillClrLst>
-    <dgm:linClrLst meth="repeat">
-      <a:schemeClr val="accent1">
-        <a:alpha val="90000"/>
-        <a:tint val="40000"/>
-      </a:schemeClr>
-    </dgm:linClrLst>
-    <dgm:effectClrLst/>
-    <dgm:txLinClrLst/>
-    <dgm:txFillClrLst meth="repeat">
-      <a:schemeClr val="dk1"/>
-    </dgm:txFillClrLst>
-    <dgm:txEffectClrLst/>
-  </dgm:styleLbl>
-  <dgm:styleLbl name="alignAccFollowNode1">
-    <dgm:fillClrLst meth="repeat">
-      <a:schemeClr val="accent1">
-        <a:alpha val="90000"/>
-        <a:tint val="40000"/>
-      </a:schemeClr>
-    </dgm:fillClrLst>
-    <dgm:linClrLst meth="repeat">
-      <a:schemeClr val="accent1">
-        <a:alpha val="90000"/>
-        <a:tint val="40000"/>
-      </a:schemeClr>
-    </dgm:linClrLst>
-    <dgm:effectClrLst/>
-    <dgm:txLinClrLst/>
-    <dgm:txFillClrLst meth="repeat">
-      <a:schemeClr val="dk1"/>
-    </dgm:txFillClrLst>
-    <dgm:txEffectClrLst/>
-  </dgm:styleLbl>
-  <dgm:styleLbl name="bgAccFollowNode1">
-    <dgm:fillClrLst meth="repeat">
-      <a:schemeClr val="accent1">
-        <a:alpha val="90000"/>
-        <a:tint val="40000"/>
-      </a:schemeClr>
-    </dgm:fillClrLst>
-    <dgm:linClrLst meth="repeat">
-      <a:schemeClr val="accent1">
-        <a:alpha val="90000"/>
-        <a:tint val="40000"/>
-      </a:schemeClr>
-    </dgm:linClrLst>
-    <dgm:effectClrLst/>
-    <dgm:txLinClrLst/>
-    <dgm:txFillClrLst meth="repeat">
-      <a:schemeClr val="dk1"/>
-    </dgm:txFillClrLst>
-    <dgm:txEffectClrLst/>
-  </dgm:styleLbl>
-  <dgm:styleLbl name="fgAcc0">
-    <dgm:fillClrLst meth="repeat">
-      <a:schemeClr val="lt1">
-        <a:alpha val="90000"/>
-      </a:schemeClr>
-    </dgm:fillClrLst>
-    <dgm:linClrLst meth="repeat">
-      <a:schemeClr val="accent1"/>
-    </dgm:linClrLst>
-    <dgm:effectClrLst/>
-    <dgm:txLinClrLst/>
-    <dgm:txFillClrLst meth="repeat">
-      <a:schemeClr val="dk1"/>
-    </dgm:txFillClrLst>
-    <dgm:txEffectClrLst/>
-  </dgm:styleLbl>
-  <dgm:styleLbl name="fgAcc2">
-    <dgm:fillClrLst meth="repeat">
-      <a:schemeClr val="lt1">
-        <a:alpha val="90000"/>
-      </a:schemeClr>
-    </dgm:fillClrLst>
-    <dgm:linClrLst meth="repeat">
-      <a:schemeClr val="accent1"/>
-    </dgm:linClrLst>
-    <dgm:effectClrLst/>
-    <dgm:txLinClrLst/>
-    <dgm:txFillClrLst meth="repeat">
-      <a:schemeClr val="dk1"/>
-    </dgm:txFillClrLst>
-    <dgm:txEffectClrLst/>
-  </dgm:styleLbl>
-  <dgm:styleLbl name="fgAcc3">
-    <dgm:fillClrLst meth="repeat">
-      <a:schemeClr val="lt1">
-        <a:alpha val="90000"/>
-      </a:schemeClr>
-    </dgm:fillClrLst>
-    <dgm:linClrLst meth="repeat">
-      <a:schemeClr val="accent1"/>
-    </dgm:linClrLst>
-    <dgm:effectClrLst/>
-    <dgm:txLinClrLst/>
-    <dgm:txFillClrLst meth="repeat">
-      <a:schemeClr val="dk1"/>
-    </dgm:txFillClrLst>
-    <dgm:txEffectClrLst/>
-  </dgm:styleLbl>
-  <dgm:styleLbl name="fgAcc4">
-    <dgm:fillClrLst meth="repeat">
-      <a:schemeClr val="lt1">
-        <a:alpha val="90000"/>
-      </a:schemeClr>
-    </dgm:fillClrLst>
-    <dgm:linClrLst meth="repeat">
-      <a:schemeClr val="accent1"/>
-    </dgm:linClrLst>
-    <dgm:effectClrLst/>
-    <dgm:txLinClrLst/>
-    <dgm:txFillClrLst meth="repeat">
-      <a:schemeClr val="dk1"/>
-    </dgm:txFillClrLst>
-    <dgm:txEffectClrLst/>
-  </dgm:styleLbl>
-  <dgm:styleLbl name="bgShp">
-    <dgm:fillClrLst meth="repeat">
-      <a:schemeClr val="accent1">
-        <a:tint val="40000"/>
-      </a:schemeClr>
-    </dgm:fillClrLst>
-    <dgm:linClrLst meth="repeat">
-      <a:schemeClr val="accent1"/>
-    </dgm:linClrLst>
-    <dgm:effectClrLst/>
-    <dgm:txLinClrLst/>
-    <dgm:txFillClrLst meth="repeat">
-      <a:schemeClr val="dk1"/>
-    </dgm:txFillClrLst>
-    <dgm:txEffectClrLst/>
-  </dgm:styleLbl>
-  <dgm:styleLbl name="dkBgShp">
-    <dgm:fillClrLst meth="repeat">
-      <a:schemeClr val="accent1">
-        <a:shade val="80000"/>
-      </a:schemeClr>
-    </dgm:fillClrLst>
-    <dgm:linClrLst meth="repeat">
-      <a:schemeClr val="accent1"/>
-    </dgm:linClrLst>
-    <dgm:effectClrLst/>
-    <dgm:txLinClrLst/>
-    <dgm:txFillClrLst meth="repeat">
-      <a:schemeClr val="lt1"/>
-    </dgm:txFillClrLst>
-    <dgm:txEffectClrLst/>
-  </dgm:styleLbl>
-  <dgm:styleLbl name="trBgShp">
-    <dgm:fillClrLst meth="repeat">
-      <a:schemeClr val="accent1">
-        <a:tint val="50000"/>
-        <a:alpha val="40000"/>
-      </a:schemeClr>
-    </dgm:fillClrLst>
-    <dgm:linClrLst meth="repeat">
-      <a:schemeClr val="accent1"/>
-    </dgm:linClrLst>
-    <dgm:effectClrLst/>
-    <dgm:txLinClrLst/>
-    <dgm:txFillClrLst meth="repeat">
-      <a:schemeClr val="lt1"/>
-    </dgm:txFillClrLst>
-    <dgm:txEffectClrLst/>
-  </dgm:styleLbl>
-  <dgm:styleLbl name="fgShp">
-    <dgm:fillClrLst meth="repeat">
-      <a:schemeClr val="accent1">
-        <a:tint val="60000"/>
-      </a:schemeClr>
-    </dgm:fillClrLst>
-    <dgm:linClrLst meth="repeat">
-      <a:schemeClr val="lt1"/>
-    </dgm:linClrLst>
-    <dgm:effectClrLst/>
-    <dgm:txLinClrLst/>
-    <dgm:txFillClrLst meth="repeat">
-      <a:schemeClr val="dk1"/>
-    </dgm:txFillClrLst>
-    <dgm:txEffectClrLst/>
-  </dgm:styleLbl>
-  <dgm:styleLbl name="revTx">
-    <dgm:fillClrLst meth="repeat">
-      <a:schemeClr val="lt1">
-        <a:alpha val="0"/>
-      </a:schemeClr>
-    </dgm:fillClrLst>
-    <dgm:linClrLst meth="repeat">
-      <a:schemeClr val="dk1">
-        <a:alpha val="0"/>
-      </a:schemeClr>
-    </dgm:linClrLst>
-    <dgm:effectClrLst/>
-    <dgm:txLinClrLst/>
-    <dgm:txFillClrLst meth="repeat">
-      <a:schemeClr val="tx1"/>
-    </dgm:txFillClrLst>
-    <dgm:txEffectClrLst/>
-  </dgm:styleLbl>
-</dgm:colorsDef>
-</file>
-
-<file path=ppt/diagrams/data1.xml><?xml version="1.0" encoding="utf-8"?>
-<dgm:dataModel xmlns:dgm="http://schemas.openxmlformats.org/drawingml/2006/diagram" xmlns:a="http://schemas.openxmlformats.org/drawingml/2006/main">
-  <dgm:ptLst>
-    <dgm:pt modelId="{F46DA54B-80CC-4C2F-9A5C-AD6B3BECEDD9}" type="doc">
-      <dgm:prSet loTypeId="urn:microsoft.com/office/officeart/2005/8/layout/cycle1" loCatId="cycle" qsTypeId="urn:microsoft.com/office/officeart/2005/8/quickstyle/3d1" qsCatId="3D" csTypeId="urn:microsoft.com/office/officeart/2005/8/colors/accent1_2" csCatId="accent1" phldr="1"/>
-      <dgm:spPr/>
-      <dgm:t>
-        <a:bodyPr/>
-        <a:lstStyle/>
-        <a:p>
-          <a:endParaRPr lang="en-US"/>
-        </a:p>
-      </dgm:t>
-    </dgm:pt>
-    <dgm:pt modelId="{4DA36331-B323-4D2F-8130-A0FAE812E8E4}">
-      <dgm:prSet phldrT="[Text]"/>
-      <dgm:spPr/>
-      <dgm:t>
-        <a:bodyPr/>
-        <a:lstStyle/>
-        <a:p>
-          <a:r>
-            <a:rPr lang="en-US" dirty="0" smtClean="0"/>
-            <a:t>Write implementation</a:t>
-          </a:r>
-          <a:endParaRPr lang="en-US" dirty="0"/>
-        </a:p>
-      </dgm:t>
-    </dgm:pt>
-    <dgm:pt modelId="{05850B98-9D3F-4538-A33B-642ADF8219F3}" type="parTrans" cxnId="{6C8749DD-1D86-49C8-B9DD-35D769ECAF9D}">
-      <dgm:prSet/>
-      <dgm:spPr/>
-      <dgm:t>
-        <a:bodyPr/>
-        <a:lstStyle/>
-        <a:p>
-          <a:endParaRPr lang="en-US"/>
-        </a:p>
-      </dgm:t>
-    </dgm:pt>
-    <dgm:pt modelId="{0EFD0ADE-C161-435B-9844-1868D23B60E1}" type="sibTrans" cxnId="{6C8749DD-1D86-49C8-B9DD-35D769ECAF9D}">
-      <dgm:prSet/>
-      <dgm:spPr/>
-      <dgm:t>
-        <a:bodyPr/>
-        <a:lstStyle/>
-        <a:p>
-          <a:endParaRPr lang="en-US"/>
-        </a:p>
-      </dgm:t>
-    </dgm:pt>
-    <dgm:pt modelId="{B8C21DA3-D191-4F66-B138-442B9CF19399}">
-      <dgm:prSet phldrT="[Text]"/>
-      <dgm:spPr/>
-      <dgm:t>
-        <a:bodyPr/>
-        <a:lstStyle/>
-        <a:p>
-          <a:r>
-            <a:rPr lang="en-US" dirty="0" smtClean="0"/>
-            <a:t>Test pass</a:t>
-          </a:r>
-          <a:endParaRPr lang="en-US" dirty="0"/>
-        </a:p>
-      </dgm:t>
-    </dgm:pt>
-    <dgm:pt modelId="{1C08AC9A-5282-4335-AA4F-64314E962DEE}" type="parTrans" cxnId="{48C1BD1E-C6C9-46DE-AC22-6250EA7444A5}">
-      <dgm:prSet/>
-      <dgm:spPr/>
-      <dgm:t>
-        <a:bodyPr/>
-        <a:lstStyle/>
-        <a:p>
-          <a:endParaRPr lang="en-US"/>
-        </a:p>
-      </dgm:t>
-    </dgm:pt>
-    <dgm:pt modelId="{32B475F6-50B1-44FE-B680-3FB77827CA70}" type="sibTrans" cxnId="{48C1BD1E-C6C9-46DE-AC22-6250EA7444A5}">
-      <dgm:prSet/>
-      <dgm:spPr/>
-      <dgm:t>
-        <a:bodyPr/>
-        <a:lstStyle/>
-        <a:p>
-          <a:endParaRPr lang="en-US"/>
-        </a:p>
-      </dgm:t>
-    </dgm:pt>
-    <dgm:pt modelId="{94D26298-E788-4AD5-81B8-BC8B6E119656}">
-      <dgm:prSet phldrT="[Text]"/>
-      <dgm:spPr/>
-      <dgm:t>
-        <a:bodyPr/>
-        <a:lstStyle/>
-        <a:p>
-          <a:r>
-            <a:rPr lang="en-US" dirty="0" smtClean="0"/>
-            <a:t>Write test</a:t>
-          </a:r>
-          <a:endParaRPr lang="en-US" dirty="0"/>
-        </a:p>
-      </dgm:t>
-    </dgm:pt>
-    <dgm:pt modelId="{CFE3B194-0C62-43BA-BEB1-A36184AC7B82}" type="parTrans" cxnId="{B4AA222D-BF67-4101-9776-BDC1CC03AD8A}">
-      <dgm:prSet/>
-      <dgm:spPr/>
-      <dgm:t>
-        <a:bodyPr/>
-        <a:lstStyle/>
-        <a:p>
-          <a:endParaRPr lang="en-US"/>
-        </a:p>
-      </dgm:t>
-    </dgm:pt>
-    <dgm:pt modelId="{3323C7D3-B27B-4042-9D29-2513B87E5FD4}" type="sibTrans" cxnId="{B4AA222D-BF67-4101-9776-BDC1CC03AD8A}">
-      <dgm:prSet/>
-      <dgm:spPr/>
-      <dgm:t>
-        <a:bodyPr/>
-        <a:lstStyle/>
-        <a:p>
-          <a:endParaRPr lang="en-US"/>
-        </a:p>
-      </dgm:t>
-    </dgm:pt>
-    <dgm:pt modelId="{29C926B6-BFB8-41A5-B532-BEE1347A324C}" type="pres">
-      <dgm:prSet presAssocID="{F46DA54B-80CC-4C2F-9A5C-AD6B3BECEDD9}" presName="cycle" presStyleCnt="0">
-        <dgm:presLayoutVars>
-          <dgm:dir/>
-          <dgm:resizeHandles val="exact"/>
-        </dgm:presLayoutVars>
-      </dgm:prSet>
-      <dgm:spPr/>
-    </dgm:pt>
-    <dgm:pt modelId="{DB00F505-F5EC-4975-BD8A-B1541D1BA79F}" type="pres">
-      <dgm:prSet presAssocID="{4DA36331-B323-4D2F-8130-A0FAE812E8E4}" presName="dummy" presStyleCnt="0"/>
-      <dgm:spPr/>
-    </dgm:pt>
-    <dgm:pt modelId="{3B5AD0A7-0102-4D03-89FE-9AF155A71D2B}" type="pres">
-      <dgm:prSet presAssocID="{4DA36331-B323-4D2F-8130-A0FAE812E8E4}" presName="node" presStyleLbl="revTx" presStyleIdx="0" presStyleCnt="3">
-        <dgm:presLayoutVars>
-          <dgm:bulletEnabled val="1"/>
-        </dgm:presLayoutVars>
-      </dgm:prSet>
-      <dgm:spPr/>
-    </dgm:pt>
-    <dgm:pt modelId="{45329735-7A95-41AB-A8A2-B5C6AE66839A}" type="pres">
-      <dgm:prSet presAssocID="{0EFD0ADE-C161-435B-9844-1868D23B60E1}" presName="sibTrans" presStyleLbl="node1" presStyleIdx="0" presStyleCnt="3"/>
-      <dgm:spPr/>
-    </dgm:pt>
-    <dgm:pt modelId="{314BA9C8-9462-47A6-B561-903099468465}" type="pres">
-      <dgm:prSet presAssocID="{B8C21DA3-D191-4F66-B138-442B9CF19399}" presName="dummy" presStyleCnt="0"/>
-      <dgm:spPr/>
-    </dgm:pt>
-    <dgm:pt modelId="{53C1B476-743F-4A6D-9AA0-FF501847C2FE}" type="pres">
-      <dgm:prSet presAssocID="{B8C21DA3-D191-4F66-B138-442B9CF19399}" presName="node" presStyleLbl="revTx" presStyleIdx="1" presStyleCnt="3">
-        <dgm:presLayoutVars>
-          <dgm:bulletEnabled val="1"/>
-        </dgm:presLayoutVars>
-      </dgm:prSet>
-      <dgm:spPr/>
-    </dgm:pt>
-    <dgm:pt modelId="{728B2F73-A8F7-4914-ACF1-02F3E0D1F518}" type="pres">
-      <dgm:prSet presAssocID="{32B475F6-50B1-44FE-B680-3FB77827CA70}" presName="sibTrans" presStyleLbl="node1" presStyleIdx="1" presStyleCnt="3"/>
-      <dgm:spPr/>
-    </dgm:pt>
-    <dgm:pt modelId="{C1D58F55-39C4-460E-8181-7442554888D0}" type="pres">
-      <dgm:prSet presAssocID="{94D26298-E788-4AD5-81B8-BC8B6E119656}" presName="dummy" presStyleCnt="0"/>
-      <dgm:spPr/>
-    </dgm:pt>
-    <dgm:pt modelId="{B55921D8-5E2B-463D-9BDA-7997171C724F}" type="pres">
-      <dgm:prSet presAssocID="{94D26298-E788-4AD5-81B8-BC8B6E119656}" presName="node" presStyleLbl="revTx" presStyleIdx="2" presStyleCnt="3">
-        <dgm:presLayoutVars>
-          <dgm:bulletEnabled val="1"/>
-        </dgm:presLayoutVars>
-      </dgm:prSet>
-      <dgm:spPr/>
-    </dgm:pt>
-    <dgm:pt modelId="{F4D1D7FF-A4CF-4081-AFB0-5710CB630227}" type="pres">
-      <dgm:prSet presAssocID="{3323C7D3-B27B-4042-9D29-2513B87E5FD4}" presName="sibTrans" presStyleLbl="node1" presStyleIdx="2" presStyleCnt="3"/>
-      <dgm:spPr/>
-    </dgm:pt>
-  </dgm:ptLst>
-  <dgm:cxnLst>
-    <dgm:cxn modelId="{48C1BD1E-C6C9-46DE-AC22-6250EA7444A5}" srcId="{F46DA54B-80CC-4C2F-9A5C-AD6B3BECEDD9}" destId="{B8C21DA3-D191-4F66-B138-442B9CF19399}" srcOrd="1" destOrd="0" parTransId="{1C08AC9A-5282-4335-AA4F-64314E962DEE}" sibTransId="{32B475F6-50B1-44FE-B680-3FB77827CA70}"/>
-    <dgm:cxn modelId="{F836A157-650F-4B44-B869-B9BF75008EEA}" type="presOf" srcId="{B8C21DA3-D191-4F66-B138-442B9CF19399}" destId="{53C1B476-743F-4A6D-9AA0-FF501847C2FE}" srcOrd="0" destOrd="0" presId="urn:microsoft.com/office/officeart/2005/8/layout/cycle1"/>
-    <dgm:cxn modelId="{FF042988-A0B7-49FB-B1F6-B5A67421F393}" type="presOf" srcId="{32B475F6-50B1-44FE-B680-3FB77827CA70}" destId="{728B2F73-A8F7-4914-ACF1-02F3E0D1F518}" srcOrd="0" destOrd="0" presId="urn:microsoft.com/office/officeart/2005/8/layout/cycle1"/>
-    <dgm:cxn modelId="{B4AA222D-BF67-4101-9776-BDC1CC03AD8A}" srcId="{F46DA54B-80CC-4C2F-9A5C-AD6B3BECEDD9}" destId="{94D26298-E788-4AD5-81B8-BC8B6E119656}" srcOrd="2" destOrd="0" parTransId="{CFE3B194-0C62-43BA-BEB1-A36184AC7B82}" sibTransId="{3323C7D3-B27B-4042-9D29-2513B87E5FD4}"/>
-    <dgm:cxn modelId="{285CCBCA-B1BB-4786-8C7E-97934C5ED9D2}" type="presOf" srcId="{0EFD0ADE-C161-435B-9844-1868D23B60E1}" destId="{45329735-7A95-41AB-A8A2-B5C6AE66839A}" srcOrd="0" destOrd="0" presId="urn:microsoft.com/office/officeart/2005/8/layout/cycle1"/>
-    <dgm:cxn modelId="{4A038CD4-B40B-4FA1-A464-D5AC5EA3D4E1}" type="presOf" srcId="{F46DA54B-80CC-4C2F-9A5C-AD6B3BECEDD9}" destId="{29C926B6-BFB8-41A5-B532-BEE1347A324C}" srcOrd="0" destOrd="0" presId="urn:microsoft.com/office/officeart/2005/8/layout/cycle1"/>
-    <dgm:cxn modelId="{5611FC61-0ECE-428E-8C90-A90D5F847E01}" type="presOf" srcId="{3323C7D3-B27B-4042-9D29-2513B87E5FD4}" destId="{F4D1D7FF-A4CF-4081-AFB0-5710CB630227}" srcOrd="0" destOrd="0" presId="urn:microsoft.com/office/officeart/2005/8/layout/cycle1"/>
-    <dgm:cxn modelId="{6C8749DD-1D86-49C8-B9DD-35D769ECAF9D}" srcId="{F46DA54B-80CC-4C2F-9A5C-AD6B3BECEDD9}" destId="{4DA36331-B323-4D2F-8130-A0FAE812E8E4}" srcOrd="0" destOrd="0" parTransId="{05850B98-9D3F-4538-A33B-642ADF8219F3}" sibTransId="{0EFD0ADE-C161-435B-9844-1868D23B60E1}"/>
-    <dgm:cxn modelId="{3E119124-E8C0-4C46-A43B-D8F4E1E44025}" type="presOf" srcId="{94D26298-E788-4AD5-81B8-BC8B6E119656}" destId="{B55921D8-5E2B-463D-9BDA-7997171C724F}" srcOrd="0" destOrd="0" presId="urn:microsoft.com/office/officeart/2005/8/layout/cycle1"/>
-    <dgm:cxn modelId="{E4619896-03CA-46B7-92C7-C0CD8B16C3A7}" type="presOf" srcId="{4DA36331-B323-4D2F-8130-A0FAE812E8E4}" destId="{3B5AD0A7-0102-4D03-89FE-9AF155A71D2B}" srcOrd="0" destOrd="0" presId="urn:microsoft.com/office/officeart/2005/8/layout/cycle1"/>
-    <dgm:cxn modelId="{071E87DA-04A6-43C8-A317-4AB7CD6EC105}" type="presParOf" srcId="{29C926B6-BFB8-41A5-B532-BEE1347A324C}" destId="{DB00F505-F5EC-4975-BD8A-B1541D1BA79F}" srcOrd="0" destOrd="0" presId="urn:microsoft.com/office/officeart/2005/8/layout/cycle1"/>
-    <dgm:cxn modelId="{5E128125-A17C-4BC0-9EF9-2B7F60522459}" type="presParOf" srcId="{29C926B6-BFB8-41A5-B532-BEE1347A324C}" destId="{3B5AD0A7-0102-4D03-89FE-9AF155A71D2B}" srcOrd="1" destOrd="0" presId="urn:microsoft.com/office/officeart/2005/8/layout/cycle1"/>
-    <dgm:cxn modelId="{FE6292F3-7075-4353-B9F2-22153876D557}" type="presParOf" srcId="{29C926B6-BFB8-41A5-B532-BEE1347A324C}" destId="{45329735-7A95-41AB-A8A2-B5C6AE66839A}" srcOrd="2" destOrd="0" presId="urn:microsoft.com/office/officeart/2005/8/layout/cycle1"/>
-    <dgm:cxn modelId="{9B40E332-C812-4AB2-85F4-C9A0607A1E54}" type="presParOf" srcId="{29C926B6-BFB8-41A5-B532-BEE1347A324C}" destId="{314BA9C8-9462-47A6-B561-903099468465}" srcOrd="3" destOrd="0" presId="urn:microsoft.com/office/officeart/2005/8/layout/cycle1"/>
-    <dgm:cxn modelId="{B48CC1B3-2ACC-4F3F-839E-2DEE8B82B966}" type="presParOf" srcId="{29C926B6-BFB8-41A5-B532-BEE1347A324C}" destId="{53C1B476-743F-4A6D-9AA0-FF501847C2FE}" srcOrd="4" destOrd="0" presId="urn:microsoft.com/office/officeart/2005/8/layout/cycle1"/>
-    <dgm:cxn modelId="{E0C45831-9EBE-43CA-BB5D-EA8F786CE473}" type="presParOf" srcId="{29C926B6-BFB8-41A5-B532-BEE1347A324C}" destId="{728B2F73-A8F7-4914-ACF1-02F3E0D1F518}" srcOrd="5" destOrd="0" presId="urn:microsoft.com/office/officeart/2005/8/layout/cycle1"/>
-    <dgm:cxn modelId="{6A11BCE0-2EC8-436D-ABEF-5BDC63962B0D}" type="presParOf" srcId="{29C926B6-BFB8-41A5-B532-BEE1347A324C}" destId="{C1D58F55-39C4-460E-8181-7442554888D0}" srcOrd="6" destOrd="0" presId="urn:microsoft.com/office/officeart/2005/8/layout/cycle1"/>
-    <dgm:cxn modelId="{F6284C42-50A8-4EA7-A544-B674BBDF128F}" type="presParOf" srcId="{29C926B6-BFB8-41A5-B532-BEE1347A324C}" destId="{B55921D8-5E2B-463D-9BDA-7997171C724F}" srcOrd="7" destOrd="0" presId="urn:microsoft.com/office/officeart/2005/8/layout/cycle1"/>
-    <dgm:cxn modelId="{19473C47-06BF-40A1-B21A-1D470F0D20AA}" type="presParOf" srcId="{29C926B6-BFB8-41A5-B532-BEE1347A324C}" destId="{F4D1D7FF-A4CF-4081-AFB0-5710CB630227}" srcOrd="8" destOrd="0" presId="urn:microsoft.com/office/officeart/2005/8/layout/cycle1"/>
-  </dgm:cxnLst>
-  <dgm:bg/>
-  <dgm:whole/>
-  <dgm:extLst>
-    <a:ext uri="http://schemas.microsoft.com/office/drawing/2008/diagram">
-      <dsp:dataModelExt xmlns:dsp="http://schemas.microsoft.com/office/drawing/2008/diagram" relId="rId6" minVer="http://schemas.openxmlformats.org/drawingml/2006/diagram"/>
-    </a:ext>
-  </dgm:extLst>
-</dgm:dataModel>
-</file>
-
-<file path=ppt/diagrams/drawing1.xml><?xml version="1.0" encoding="utf-8"?>
-<dsp:drawing xmlns:dgm="http://schemas.openxmlformats.org/drawingml/2006/diagram" xmlns:dsp="http://schemas.microsoft.com/office/drawing/2008/diagram" xmlns:a="http://schemas.openxmlformats.org/drawingml/2006/main">
-  <dsp:spTree>
-    <dsp:nvGrpSpPr>
-      <dsp:cNvPr id="0" name=""/>
-      <dsp:cNvGrpSpPr/>
-    </dsp:nvGrpSpPr>
-    <dsp:grpSpPr/>
-    <dsp:sp modelId="{3B5AD0A7-0102-4D03-89FE-9AF155A71D2B}">
-      <dsp:nvSpPr>
-        <dsp:cNvPr id="0" name=""/>
-        <dsp:cNvSpPr/>
-      </dsp:nvSpPr>
-      <dsp:spPr>
-        <a:xfrm>
-          <a:off x="4695402" y="333237"/>
-          <a:ext cx="1707802" cy="1707802"/>
-        </a:xfrm>
-        <a:prstGeom prst="rect">
-          <a:avLst/>
-        </a:prstGeom>
-        <a:noFill/>
-        <a:ln>
-          <a:noFill/>
-        </a:ln>
-        <a:effectLst/>
-      </dsp:spPr>
-      <dsp:style>
-        <a:lnRef idx="0">
-          <a:scrgbClr r="0" g="0" b="0"/>
-        </a:lnRef>
-        <a:fillRef idx="0">
-          <a:scrgbClr r="0" g="0" b="0"/>
-        </a:fillRef>
-        <a:effectRef idx="0">
-          <a:scrgbClr r="0" g="0" b="0"/>
-        </a:effectRef>
-        <a:fontRef idx="minor"/>
-      </dsp:style>
-      <dsp:txBody>
-        <a:bodyPr spcFirstLastPara="0" vert="horz" wrap="square" lIns="25400" tIns="25400" rIns="25400" bIns="25400" numCol="1" spcCol="1270" anchor="ctr" anchorCtr="0">
-          <a:noAutofit/>
-        </a:bodyPr>
-        <a:lstStyle/>
-        <a:p>
-          <a:pPr lvl="0" algn="ctr" defTabSz="889000">
-            <a:lnSpc>
-              <a:spcPct val="90000"/>
-            </a:lnSpc>
-            <a:spcBef>
-              <a:spcPct val="0"/>
-            </a:spcBef>
-            <a:spcAft>
-              <a:spcPct val="35000"/>
-            </a:spcAft>
-          </a:pPr>
-          <a:r>
-            <a:rPr lang="en-US" sz="2000" kern="1200" dirty="0" smtClean="0"/>
-            <a:t>Write implementation</a:t>
-          </a:r>
-          <a:endParaRPr lang="en-US" sz="2000" kern="1200" dirty="0"/>
-        </a:p>
-      </dsp:txBody>
-      <dsp:txXfrm>
-        <a:off x="4695402" y="333237"/>
-        <a:ext cx="1707802" cy="1707802"/>
-      </dsp:txXfrm>
-    </dsp:sp>
-    <dsp:sp modelId="{45329735-7A95-41AB-A8A2-B5C6AE66839A}">
-      <dsp:nvSpPr>
-        <dsp:cNvPr id="0" name=""/>
-        <dsp:cNvSpPr/>
-      </dsp:nvSpPr>
-      <dsp:spPr>
-        <a:xfrm>
-          <a:off x="2097603" y="-1846"/>
-          <a:ext cx="4034392" cy="4034392"/>
-        </a:xfrm>
-        <a:prstGeom prst="circularArrow">
-          <a:avLst>
-            <a:gd name="adj1" fmla="val 8255"/>
-            <a:gd name="adj2" fmla="val 576638"/>
-            <a:gd name="adj3" fmla="val 2961472"/>
-            <a:gd name="adj4" fmla="val 53319"/>
-            <a:gd name="adj5" fmla="val 9630"/>
-          </a:avLst>
-        </a:prstGeom>
-        <a:gradFill rotWithShape="0">
-          <a:gsLst>
-            <a:gs pos="0">
-              <a:schemeClr val="accent1">
-                <a:hueOff val="0"/>
-                <a:satOff val="0"/>
-                <a:lumOff val="0"/>
-                <a:alphaOff val="0"/>
-                <a:shade val="51000"/>
-                <a:satMod val="130000"/>
-              </a:schemeClr>
-            </a:gs>
-            <a:gs pos="80000">
-              <a:schemeClr val="accent1">
-                <a:hueOff val="0"/>
-                <a:satOff val="0"/>
-                <a:lumOff val="0"/>
-                <a:alphaOff val="0"/>
-                <a:shade val="93000"/>
-                <a:satMod val="130000"/>
-              </a:schemeClr>
-            </a:gs>
-            <a:gs pos="100000">
-              <a:schemeClr val="accent1">
-                <a:hueOff val="0"/>
-                <a:satOff val="0"/>
-                <a:lumOff val="0"/>
-                <a:alphaOff val="0"/>
-                <a:shade val="94000"/>
-                <a:satMod val="135000"/>
-              </a:schemeClr>
-            </a:gs>
-          </a:gsLst>
-          <a:lin ang="16200000" scaled="0"/>
-        </a:gradFill>
-        <a:ln>
-          <a:noFill/>
-        </a:ln>
-        <a:effectLst>
-          <a:outerShdw blurRad="40000" dist="23000" dir="5400000" rotWithShape="0">
-            <a:srgbClr val="000000">
-              <a:alpha val="35000"/>
-            </a:srgbClr>
-          </a:outerShdw>
-        </a:effectLst>
-        <a:scene3d>
-          <a:camera prst="orthographicFront"/>
-          <a:lightRig rig="flat" dir="t"/>
-        </a:scene3d>
-        <a:sp3d prstMaterial="plastic">
-          <a:bevelT w="120900" h="88900"/>
-          <a:bevelB w="88900" h="31750" prst="angle"/>
-        </a:sp3d>
-      </dsp:spPr>
-      <dsp:style>
-        <a:lnRef idx="0">
-          <a:scrgbClr r="0" g="0" b="0"/>
-        </a:lnRef>
-        <a:fillRef idx="3">
-          <a:scrgbClr r="0" g="0" b="0"/>
-        </a:fillRef>
-        <a:effectRef idx="2">
-          <a:scrgbClr r="0" g="0" b="0"/>
-        </a:effectRef>
-        <a:fontRef idx="minor">
-          <a:schemeClr val="lt1"/>
-        </a:fontRef>
-      </dsp:style>
-    </dsp:sp>
-    <dsp:sp modelId="{53C1B476-743F-4A6D-9AA0-FF501847C2FE}">
-      <dsp:nvSpPr>
-        <dsp:cNvPr id="0" name=""/>
-        <dsp:cNvSpPr/>
-      </dsp:nvSpPr>
-      <dsp:spPr>
-        <a:xfrm>
-          <a:off x="3260898" y="2817871"/>
-          <a:ext cx="1707802" cy="1707802"/>
-        </a:xfrm>
-        <a:prstGeom prst="rect">
-          <a:avLst/>
-        </a:prstGeom>
-        <a:noFill/>
-        <a:ln>
-          <a:noFill/>
-        </a:ln>
-        <a:effectLst/>
-      </dsp:spPr>
-      <dsp:style>
-        <a:lnRef idx="0">
-          <a:scrgbClr r="0" g="0" b="0"/>
-        </a:lnRef>
-        <a:fillRef idx="0">
-          <a:scrgbClr r="0" g="0" b="0"/>
-        </a:fillRef>
-        <a:effectRef idx="0">
-          <a:scrgbClr r="0" g="0" b="0"/>
-        </a:effectRef>
-        <a:fontRef idx="minor"/>
-      </dsp:style>
-      <dsp:txBody>
-        <a:bodyPr spcFirstLastPara="0" vert="horz" wrap="square" lIns="25400" tIns="25400" rIns="25400" bIns="25400" numCol="1" spcCol="1270" anchor="ctr" anchorCtr="0">
-          <a:noAutofit/>
-        </a:bodyPr>
-        <a:lstStyle/>
-        <a:p>
-          <a:pPr lvl="0" algn="ctr" defTabSz="889000">
-            <a:lnSpc>
-              <a:spcPct val="90000"/>
-            </a:lnSpc>
-            <a:spcBef>
-              <a:spcPct val="0"/>
-            </a:spcBef>
-            <a:spcAft>
-              <a:spcPct val="35000"/>
-            </a:spcAft>
-          </a:pPr>
-          <a:r>
-            <a:rPr lang="en-US" sz="2000" kern="1200" dirty="0" smtClean="0"/>
-            <a:t>Test pass</a:t>
-          </a:r>
-          <a:endParaRPr lang="en-US" sz="2000" kern="1200" dirty="0"/>
-        </a:p>
-      </dsp:txBody>
-      <dsp:txXfrm>
-        <a:off x="3260898" y="2817871"/>
-        <a:ext cx="1707802" cy="1707802"/>
-      </dsp:txXfrm>
-    </dsp:sp>
-    <dsp:sp modelId="{728B2F73-A8F7-4914-ACF1-02F3E0D1F518}">
-      <dsp:nvSpPr>
-        <dsp:cNvPr id="0" name=""/>
-        <dsp:cNvSpPr/>
-      </dsp:nvSpPr>
-      <dsp:spPr>
-        <a:xfrm>
-          <a:off x="2097603" y="-1846"/>
-          <a:ext cx="4034392" cy="4034392"/>
-        </a:xfrm>
-        <a:prstGeom prst="circularArrow">
-          <a:avLst>
-            <a:gd name="adj1" fmla="val 8255"/>
-            <a:gd name="adj2" fmla="val 576638"/>
-            <a:gd name="adj3" fmla="val 10170043"/>
-            <a:gd name="adj4" fmla="val 7261890"/>
-            <a:gd name="adj5" fmla="val 9630"/>
-          </a:avLst>
-        </a:prstGeom>
-        <a:gradFill rotWithShape="0">
-          <a:gsLst>
-            <a:gs pos="0">
-              <a:schemeClr val="accent1">
-                <a:hueOff val="0"/>
-                <a:satOff val="0"/>
-                <a:lumOff val="0"/>
-                <a:alphaOff val="0"/>
-                <a:shade val="51000"/>
-                <a:satMod val="130000"/>
-              </a:schemeClr>
-            </a:gs>
-            <a:gs pos="80000">
-              <a:schemeClr val="accent1">
-                <a:hueOff val="0"/>
-                <a:satOff val="0"/>
-                <a:lumOff val="0"/>
-                <a:alphaOff val="0"/>
-                <a:shade val="93000"/>
-                <a:satMod val="130000"/>
-              </a:schemeClr>
-            </a:gs>
-            <a:gs pos="100000">
-              <a:schemeClr val="accent1">
-                <a:hueOff val="0"/>
-                <a:satOff val="0"/>
-                <a:lumOff val="0"/>
-                <a:alphaOff val="0"/>
-                <a:shade val="94000"/>
-                <a:satMod val="135000"/>
-              </a:schemeClr>
-            </a:gs>
-          </a:gsLst>
-          <a:lin ang="16200000" scaled="0"/>
-        </a:gradFill>
-        <a:ln>
-          <a:noFill/>
-        </a:ln>
-        <a:effectLst>
-          <a:outerShdw blurRad="40000" dist="23000" dir="5400000" rotWithShape="0">
-            <a:srgbClr val="000000">
-              <a:alpha val="35000"/>
-            </a:srgbClr>
-          </a:outerShdw>
-        </a:effectLst>
-        <a:scene3d>
-          <a:camera prst="orthographicFront"/>
-          <a:lightRig rig="flat" dir="t"/>
-        </a:scene3d>
-        <a:sp3d prstMaterial="plastic">
-          <a:bevelT w="120900" h="88900"/>
-          <a:bevelB w="88900" h="31750" prst="angle"/>
-        </a:sp3d>
-      </dsp:spPr>
-      <dsp:style>
-        <a:lnRef idx="0">
-          <a:scrgbClr r="0" g="0" b="0"/>
-        </a:lnRef>
-        <a:fillRef idx="3">
-          <a:scrgbClr r="0" g="0" b="0"/>
-        </a:fillRef>
-        <a:effectRef idx="2">
-          <a:scrgbClr r="0" g="0" b="0"/>
-        </a:effectRef>
-        <a:fontRef idx="minor">
-          <a:schemeClr val="lt1"/>
-        </a:fontRef>
-      </dsp:style>
-    </dsp:sp>
-    <dsp:sp modelId="{B55921D8-5E2B-463D-9BDA-7997171C724F}">
-      <dsp:nvSpPr>
-        <dsp:cNvPr id="0" name=""/>
-        <dsp:cNvSpPr/>
-      </dsp:nvSpPr>
-      <dsp:spPr>
-        <a:xfrm>
-          <a:off x="1826394" y="333237"/>
-          <a:ext cx="1707802" cy="1707802"/>
-        </a:xfrm>
-        <a:prstGeom prst="rect">
-          <a:avLst/>
-        </a:prstGeom>
-        <a:noFill/>
-        <a:ln>
-          <a:noFill/>
-        </a:ln>
-        <a:effectLst/>
-      </dsp:spPr>
-      <dsp:style>
-        <a:lnRef idx="0">
-          <a:scrgbClr r="0" g="0" b="0"/>
-        </a:lnRef>
-        <a:fillRef idx="0">
-          <a:scrgbClr r="0" g="0" b="0"/>
-        </a:fillRef>
-        <a:effectRef idx="0">
-          <a:scrgbClr r="0" g="0" b="0"/>
-        </a:effectRef>
-        <a:fontRef idx="minor"/>
-      </dsp:style>
-      <dsp:txBody>
-        <a:bodyPr spcFirstLastPara="0" vert="horz" wrap="square" lIns="25400" tIns="25400" rIns="25400" bIns="25400" numCol="1" spcCol="1270" anchor="ctr" anchorCtr="0">
-          <a:noAutofit/>
-        </a:bodyPr>
-        <a:lstStyle/>
-        <a:p>
-          <a:pPr lvl="0" algn="ctr" defTabSz="889000">
-            <a:lnSpc>
-              <a:spcPct val="90000"/>
-            </a:lnSpc>
-            <a:spcBef>
-              <a:spcPct val="0"/>
-            </a:spcBef>
-            <a:spcAft>
-              <a:spcPct val="35000"/>
-            </a:spcAft>
-          </a:pPr>
-          <a:r>
-            <a:rPr lang="en-US" sz="2000" kern="1200" dirty="0" smtClean="0"/>
-            <a:t>Write test</a:t>
-          </a:r>
-          <a:endParaRPr lang="en-US" sz="2000" kern="1200" dirty="0"/>
-        </a:p>
-      </dsp:txBody>
-      <dsp:txXfrm>
-        <a:off x="1826394" y="333237"/>
-        <a:ext cx="1707802" cy="1707802"/>
-      </dsp:txXfrm>
-    </dsp:sp>
-    <dsp:sp modelId="{F4D1D7FF-A4CF-4081-AFB0-5710CB630227}">
-      <dsp:nvSpPr>
-        <dsp:cNvPr id="0" name=""/>
-        <dsp:cNvSpPr/>
-      </dsp:nvSpPr>
-      <dsp:spPr>
-        <a:xfrm>
-          <a:off x="2097603" y="-1846"/>
-          <a:ext cx="4034392" cy="4034392"/>
-        </a:xfrm>
-        <a:prstGeom prst="circularArrow">
-          <a:avLst>
-            <a:gd name="adj1" fmla="val 8255"/>
-            <a:gd name="adj2" fmla="val 576638"/>
-            <a:gd name="adj3" fmla="val 16854496"/>
-            <a:gd name="adj4" fmla="val 14968867"/>
-            <a:gd name="adj5" fmla="val 9630"/>
-          </a:avLst>
-        </a:prstGeom>
-        <a:gradFill rotWithShape="0">
-          <a:gsLst>
-            <a:gs pos="0">
-              <a:schemeClr val="accent1">
-                <a:hueOff val="0"/>
-                <a:satOff val="0"/>
-                <a:lumOff val="0"/>
-                <a:alphaOff val="0"/>
-                <a:shade val="51000"/>
-                <a:satMod val="130000"/>
-              </a:schemeClr>
-            </a:gs>
-            <a:gs pos="80000">
-              <a:schemeClr val="accent1">
-                <a:hueOff val="0"/>
-                <a:satOff val="0"/>
-                <a:lumOff val="0"/>
-                <a:alphaOff val="0"/>
-                <a:shade val="93000"/>
-                <a:satMod val="130000"/>
-              </a:schemeClr>
-            </a:gs>
-            <a:gs pos="100000">
-              <a:schemeClr val="accent1">
-                <a:hueOff val="0"/>
-                <a:satOff val="0"/>
-                <a:lumOff val="0"/>
-                <a:alphaOff val="0"/>
-                <a:shade val="94000"/>
-                <a:satMod val="135000"/>
-              </a:schemeClr>
-            </a:gs>
-          </a:gsLst>
-          <a:lin ang="16200000" scaled="0"/>
-        </a:gradFill>
-        <a:ln>
-          <a:noFill/>
-        </a:ln>
-        <a:effectLst>
-          <a:outerShdw blurRad="40000" dist="23000" dir="5400000" rotWithShape="0">
-            <a:srgbClr val="000000">
-              <a:alpha val="35000"/>
-            </a:srgbClr>
-          </a:outerShdw>
-        </a:effectLst>
-        <a:scene3d>
-          <a:camera prst="orthographicFront"/>
-          <a:lightRig rig="flat" dir="t"/>
-        </a:scene3d>
-        <a:sp3d prstMaterial="plastic">
-          <a:bevelT w="120900" h="88900"/>
-          <a:bevelB w="88900" h="31750" prst="angle"/>
-        </a:sp3d>
-      </dsp:spPr>
-      <dsp:style>
-        <a:lnRef idx="0">
-          <a:scrgbClr r="0" g="0" b="0"/>
-        </a:lnRef>
-        <a:fillRef idx="3">
-          <a:scrgbClr r="0" g="0" b="0"/>
-        </a:fillRef>
-        <a:effectRef idx="2">
-          <a:scrgbClr r="0" g="0" b="0"/>
-        </a:effectRef>
-        <a:fontRef idx="minor">
-          <a:schemeClr val="lt1"/>
-        </a:fontRef>
-      </dsp:style>
-    </dsp:sp>
-  </dsp:spTree>
-</dsp:drawing>
-</file>
-
-<file path=ppt/diagrams/layout1.xml><?xml version="1.0" encoding="utf-8"?>
-<dgm:layoutDef xmlns:dgm="http://schemas.openxmlformats.org/drawingml/2006/diagram" xmlns:a="http://schemas.openxmlformats.org/drawingml/2006/main" uniqueId="urn:microsoft.com/office/officeart/2005/8/layout/cycle1">
-  <dgm:title val=""/>
-  <dgm:desc val=""/>
-  <dgm:catLst>
-    <dgm:cat type="cycle" pri="2000"/>
-  </dgm:catLst>
-  <dgm:sampData>
-    <dgm:dataModel>
-      <dgm:ptLst>
-        <dgm:pt modelId="0" type="doc"/>
-        <dgm:pt modelId="1">
-          <dgm:prSet phldr="1"/>
-        </dgm:pt>
-        <dgm:pt modelId="2">
-          <dgm:prSet phldr="1"/>
-        </dgm:pt>
-        <dgm:pt modelId="3">
-          <dgm:prSet phldr="1"/>
-        </dgm:pt>
-        <dgm:pt modelId="4">
-          <dgm:prSet phldr="1"/>
-        </dgm:pt>
-        <dgm:pt modelId="5">
-          <dgm:prSet phldr="1"/>
-        </dgm:pt>
-      </dgm:ptLst>
-      <dgm:cxnLst>
-        <dgm:cxn modelId="6" srcId="0" destId="1" srcOrd="0" destOrd="0"/>
-        <dgm:cxn modelId="7" srcId="0" destId="2" srcOrd="1" destOrd="0"/>
-        <dgm:cxn modelId="8" srcId="0" destId="3" srcOrd="2" destOrd="0"/>
-        <dgm:cxn modelId="9" srcId="0" destId="4" srcOrd="3" destOrd="0"/>
-        <dgm:cxn modelId="10" srcId="0" destId="5" srcOrd="4" destOrd="0"/>
-      </dgm:cxnLst>
-      <dgm:bg/>
-      <dgm:whole/>
-    </dgm:dataModel>
-  </dgm:sampData>
-  <dgm:styleData>
-    <dgm:dataModel>
-      <dgm:ptLst>
-        <dgm:pt modelId="0" type="doc"/>
-        <dgm:pt modelId="1"/>
-        <dgm:pt modelId="2"/>
-        <dgm:pt modelId="3"/>
-      </dgm:ptLst>
-      <dgm:cxnLst>
-        <dgm:cxn modelId="4" srcId="0" destId="1" srcOrd="0" destOrd="0"/>
-        <dgm:cxn modelId="5" srcId="0" destId="2" srcOrd="1" destOrd="0"/>
-        <dgm:cxn modelId="6" srcId="0" destId="3" srcOrd="2" destOrd="0"/>
-      </dgm:cxnLst>
-      <dgm:bg/>
-      <dgm:whole/>
-    </dgm:dataModel>
-  </dgm:styleData>
-  <dgm:clrData>
-    <dgm:dataModel>
-      <dgm:ptLst>
-        <dgm:pt modelId="0" type="doc"/>
-        <dgm:pt modelId="1"/>
-        <dgm:pt modelId="2"/>
-        <dgm:pt modelId="3"/>
-        <dgm:pt modelId="4"/>
-        <dgm:pt modelId="5"/>
-        <dgm:pt modelId="6"/>
-      </dgm:ptLst>
-      <dgm:cxnLst>
-        <dgm:cxn modelId="7" srcId="0" destId="1" srcOrd="0" destOrd="0"/>
-        <dgm:cxn modelId="8" srcId="0" destId="2" srcOrd="1" destOrd="0"/>
-        <dgm:cxn modelId="9" srcId="0" destId="3" srcOrd="2" destOrd="0"/>
-        <dgm:cxn modelId="10" srcId="0" destId="4" srcOrd="3" destOrd="0"/>
-        <dgm:cxn modelId="11" srcId="0" destId="5" srcOrd="4" destOrd="0"/>
-        <dgm:cxn modelId="12" srcId="0" destId="6" srcOrd="5" destOrd="0"/>
-      </dgm:cxnLst>
-      <dgm:bg/>
-      <dgm:whole/>
-    </dgm:dataModel>
-  </dgm:clrData>
-  <dgm:layoutNode name="cycle">
-    <dgm:varLst>
-      <dgm:dir/>
-      <dgm:resizeHandles val="exact"/>
-    </dgm:varLst>
-    <dgm:choose name="Name0">
-      <dgm:if name="Name1" func="var" arg="dir" op="equ" val="norm">
-        <dgm:alg type="cycle">
-          <dgm:param type="stAng" val="0"/>
-          <dgm:param type="spanAng" val="360"/>
-        </dgm:alg>
-      </dgm:if>
-      <dgm:else name="Name2">
-        <dgm:alg type="cycle">
-          <dgm:param type="stAng" val="0"/>
-          <dgm:param type="spanAng" val="-360"/>
-        </dgm:alg>
-      </dgm:else>
-    </dgm:choose>
-    <dgm:shape xmlns:r="http://schemas.openxmlformats.org/officeDocument/2006/relationships" r:blip="">
-      <dgm:adjLst/>
-    </dgm:shape>
-    <dgm:presOf/>
-    <dgm:choose name="Name3">
-      <dgm:if name="Name4" func="var" arg="dir" op="equ" val="norm">
-        <dgm:constrLst>
-          <dgm:constr type="diam" val="1"/>
-          <dgm:constr type="w" for="ch" forName="node" refType="w"/>
-          <dgm:constr type="w" for="ch" ptType="sibTrans" refType="w" refFor="ch" refForName="node" fact="0.5"/>
-          <dgm:constr type="h" for="ch" ptType="sibTrans" op="equ"/>
-          <dgm:constr type="diam" for="ch" ptType="sibTrans" refType="diam" op="equ"/>
-          <dgm:constr type="sibSp" refType="w" refFor="ch" refForName="node" fact="0.15"/>
-          <dgm:constr type="w" for="ch" forName="dummy" refType="sibSp" fact="2.8"/>
-          <dgm:constr type="primFontSz" for="ch" forName="node" op="equ" val="65"/>
-        </dgm:constrLst>
-      </dgm:if>
-      <dgm:else name="Name5">
-        <dgm:constrLst>
-          <dgm:constr type="diam" val="1"/>
-          <dgm:constr type="w" for="ch" forName="node" refType="w"/>
-          <dgm:constr type="w" for="ch" ptType="sibTrans" refType="w" refFor="ch" refForName="node" fact="0.5"/>
-          <dgm:constr type="h" for="ch" ptType="sibTrans" op="equ"/>
-          <dgm:constr type="diam" for="ch" ptType="sibTrans" refType="diam" op="equ" fact="-1"/>
-          <dgm:constr type="sibSp" refType="w" refFor="ch" refForName="node" fact="0.15"/>
-          <dgm:constr type="w" for="ch" forName="dummy" refType="sibSp" fact="2.8"/>
-          <dgm:constr type="primFontSz" for="ch" forName="node" op="equ" val="65"/>
-        </dgm:constrLst>
-      </dgm:else>
-    </dgm:choose>
-    <dgm:ruleLst>
-      <dgm:rule type="diam" val="INF" fact="NaN" max="NaN"/>
-    </dgm:ruleLst>
-    <dgm:forEach name="nodesForEach" axis="ch" ptType="node">
-      <dgm:choose name="Name6">
-        <dgm:if name="Name7" axis="par ch" ptType="doc node" func="cnt" op="gt" val="1">
-          <dgm:layoutNode name="dummy">
-            <dgm:alg type="sp"/>
-            <dgm:shape xmlns:r="http://schemas.openxmlformats.org/officeDocument/2006/relationships" r:blip="">
-              <dgm:adjLst/>
-            </dgm:shape>
-            <dgm:presOf/>
-            <dgm:constrLst>
-              <dgm:constr type="h" refType="w"/>
-            </dgm:constrLst>
-            <dgm:ruleLst/>
-          </dgm:layoutNode>
-        </dgm:if>
-        <dgm:else name="Name8"/>
-      </dgm:choose>
-      <dgm:layoutNode name="node" styleLbl="revTx">
-        <dgm:varLst>
-          <dgm:bulletEnabled val="1"/>
-        </dgm:varLst>
-        <dgm:alg type="tx">
-          <dgm:param type="txAnchorVertCh" val="mid"/>
-        </dgm:alg>
-        <dgm:shape xmlns:r="http://schemas.openxmlformats.org/officeDocument/2006/relationships" type="rect" r:blip="">
-          <dgm:adjLst/>
-        </dgm:shape>
-        <dgm:presOf axis="desOrSelf" ptType="node"/>
-        <dgm:constrLst>
-          <dgm:constr type="h" refType="w"/>
-          <dgm:constr type="lMarg" refType="primFontSz" fact="0.1"/>
-          <dgm:constr type="rMarg" refType="primFontSz" fact="0.1"/>
-          <dgm:constr type="tMarg" refType="primFontSz" fact="0.1"/>
-          <dgm:constr type="bMarg" refType="primFontSz" fact="0.1"/>
-        </dgm:constrLst>
-        <dgm:ruleLst>
-          <dgm:rule type="primFontSz" val="5" fact="NaN" max="NaN"/>
-        </dgm:ruleLst>
-      </dgm:layoutNode>
-      <dgm:choose name="Name9">
-        <dgm:if name="Name10" axis="par ch" ptType="doc node" func="cnt" op="gt" val="1">
-          <dgm:forEach name="Name11" axis="followSib" ptType="sibTrans" hideLastTrans="0" cnt="1">
-            <dgm:layoutNode name="sibTrans" styleLbl="node1">
-              <dgm:alg type="conn">
-                <dgm:param type="connRout" val="curve"/>
-                <dgm:param type="begPts" val="radial"/>
-                <dgm:param type="endPts" val="radial"/>
-              </dgm:alg>
-              <dgm:shape xmlns:r="http://schemas.openxmlformats.org/officeDocument/2006/relationships" type="conn" r:blip="">
-                <dgm:adjLst/>
-              </dgm:shape>
-              <dgm:presOf axis="self"/>
-              <dgm:constrLst>
-                <dgm:constr type="h" refType="w" fact="0.65"/>
-                <dgm:constr type="begPad"/>
-                <dgm:constr type="endPad"/>
-              </dgm:constrLst>
-              <dgm:ruleLst/>
-            </dgm:layoutNode>
-          </dgm:forEach>
-        </dgm:if>
-        <dgm:else name="Name12"/>
-      </dgm:choose>
-    </dgm:forEach>
-  </dgm:layoutNode>
-</dgm:layoutDef>
-</file>
-
-<file path=ppt/diagrams/quickStyle1.xml><?xml version="1.0" encoding="utf-8"?>
-<dgm:styleDef xmlns:dgm="http://schemas.openxmlformats.org/drawingml/2006/diagram" xmlns:a="http://schemas.openxmlformats.org/drawingml/2006/main" uniqueId="urn:microsoft.com/office/officeart/2005/8/quickstyle/3d1">
-  <dgm:title val=""/>
-  <dgm:desc val=""/>
-  <dgm:catLst>
-    <dgm:cat type="3D" pri="11100"/>
-  </dgm:catLst>
-  <dgm:scene3d>
-    <a:camera prst="orthographicFront"/>
-    <a:lightRig rig="threePt" dir="t"/>
-  </dgm:scene3d>
-  <dgm:styleLbl name="node0">
-    <dgm:scene3d>
-      <a:camera prst="orthographicFront"/>
-      <a:lightRig rig="flat" dir="t"/>
-    </dgm:scene3d>
-    <dgm:sp3d prstMaterial="plastic">
-      <a:bevelT w="120900" h="88900"/>
-      <a:bevelB w="88900" h="31750" prst="angle"/>
-    </dgm:sp3d>
-    <dgm:txPr/>
-    <dgm:style>
-      <a:lnRef idx="0">
-        <a:scrgbClr r="0" g="0" b="0"/>
-      </a:lnRef>
-      <a:fillRef idx="3">
-        <a:scrgbClr r="0" g="0" b="0"/>
-      </a:fillRef>
-      <a:effectRef idx="2">
-        <a:scrgbClr r="0" g="0" b="0"/>
-      </a:effectRef>
-      <a:fontRef idx="minor">
-        <a:schemeClr val="lt1"/>
-      </a:fontRef>
-    </dgm:style>
-  </dgm:styleLbl>
-  <dgm:styleLbl name="lnNode1">
-    <dgm:scene3d>
-      <a:camera prst="orthographicFront"/>
-      <a:lightRig rig="flat" dir="t"/>
-    </dgm:scene3d>
-    <dgm:sp3d prstMaterial="plastic">
-      <a:bevelT w="120900" h="88900"/>
-      <a:bevelB w="88900" h="31750" prst="angle"/>
-    </dgm:sp3d>
-    <dgm:txPr/>
-    <dgm:style>
-      <a:lnRef idx="0">
-        <a:scrgbClr r="0" g="0" b="0"/>
-      </a:lnRef>
-      <a:fillRef idx="3">
-        <a:scrgbClr r="0" g="0" b="0"/>
-      </a:fillRef>
-      <a:effectRef idx="1">
-        <a:scrgbClr r="0" g="0" b="0"/>
-      </a:effectRef>
-      <a:fontRef idx="minor">
-        <a:schemeClr val="lt1"/>
-      </a:fontRef>
-    </dgm:style>
-  </dgm:styleLbl>
-  <dgm:styleLbl name="vennNode1">
-    <dgm:scene3d>
-      <a:camera prst="orthographicFront"/>
-      <a:lightRig rig="flat" dir="t"/>
-    </dgm:scene3d>
-    <dgm:sp3d prstMaterial="plastic">
-      <a:bevelT w="120900" h="88900"/>
-      <a:bevelB w="88900" h="31750" prst="angle"/>
-    </dgm:sp3d>
-    <dgm:txPr/>
-    <dgm:style>
-      <a:lnRef idx="0">
-        <a:scrgbClr r="0" g="0" b="0"/>
-      </a:lnRef>
-      <a:fillRef idx="1">
-        <a:scrgbClr r="0" g="0" b="0"/>
-      </a:fillRef>
-      <a:effectRef idx="1">
-        <a:scrgbClr r="0" g="0" b="0"/>
-      </a:effectRef>
-      <a:fontRef idx="minor">
-        <a:schemeClr val="tx1"/>
-      </a:fontRef>
-    </dgm:style>
-  </dgm:styleLbl>
-  <dgm:styleLbl name="alignNode1">
-    <dgm:scene3d>
-      <a:camera prst="orthographicFront"/>
-      <a:lightRig rig="flat" dir="t"/>
-    </dgm:scene3d>
-    <dgm:sp3d prstMaterial="plastic">
-      <a:bevelT w="120900" h="88900"/>
-      <a:bevelB w="88900" h="31750" prst="angle"/>
-    </dgm:sp3d>
-    <dgm:txPr/>
-    <dgm:style>
-      <a:lnRef idx="1">
-        <a:scrgbClr r="0" g="0" b="0"/>
-      </a:lnRef>
-      <a:fillRef idx="3">
-        <a:scrgbClr r="0" g="0" b="0"/>
-      </a:fillRef>
-      <a:effectRef idx="2">
-        <a:scrgbClr r="0" g="0" b="0"/>
-      </a:effectRef>
-      <a:fontRef idx="minor">
-        <a:schemeClr val="lt1"/>
-      </a:fontRef>
-    </dgm:style>
-  </dgm:styleLbl>
-  <dgm:styleLbl name="node1">
-    <dgm:scene3d>
-      <a:camera prst="orthographicFront"/>
-      <a:lightRig rig="flat" dir="t"/>
-    </dgm:scene3d>
-    <dgm:sp3d prstMaterial="plastic">
-      <a:bevelT w="120900" h="88900"/>
-      <a:bevelB w="88900" h="31750" prst="angle"/>
-    </dgm:sp3d>
-    <dgm:txPr/>
-    <dgm:style>
-      <a:lnRef idx="0">
-        <a:scrgbClr r="0" g="0" b="0"/>
-      </a:lnRef>
-      <a:fillRef idx="3">
-        <a:scrgbClr r="0" g="0" b="0"/>
-      </a:fillRef>
-      <a:effectRef idx="2">
-        <a:scrgbClr r="0" g="0" b="0"/>
-      </a:effectRef>
-      <a:fontRef idx="minor">
-        <a:schemeClr val="lt1"/>
-      </a:fontRef>
-    </dgm:style>
-  </dgm:styleLbl>
-  <dgm:styleLbl name="node2">
-    <dgm:scene3d>
-      <a:camera prst="orthographicFront"/>
-      <a:lightRig rig="flat" dir="t"/>
-    </dgm:scene3d>
-    <dgm:sp3d prstMaterial="plastic">
-      <a:bevelT w="120900" h="88900"/>
-      <a:bevelB w="88900" h="31750" prst="angle"/>
-    </dgm:sp3d>
-    <dgm:txPr/>
-    <dgm:style>
-      <a:lnRef idx="0">
-        <a:scrgbClr r="0" g="0" b="0"/>
-      </a:lnRef>
-      <a:fillRef idx="3">
-        <a:scrgbClr r="0" g="0" b="0"/>
-      </a:fillRef>
-      <a:effectRef idx="1">
-        <a:scrgbClr r="0" g="0" b="0"/>
-      </a:effectRef>
-      <a:fontRef idx="minor">
-        <a:schemeClr val="lt1"/>
-      </a:fontRef>
-    </dgm:style>
-  </dgm:styleLbl>
-  <dgm:styleLbl name="node3">
-    <dgm:scene3d>
-      <a:camera prst="orthographicFront"/>
-      <a:lightRig rig="flat" dir="t"/>
-    </dgm:scene3d>
-    <dgm:sp3d prstMaterial="plastic">
-      <a:bevelT w="120900" h="88900"/>
-      <a:bevelB w="88900" h="31750" prst="angle"/>
-    </dgm:sp3d>
-    <dgm:txPr/>
-    <dgm:style>
-      <a:lnRef idx="0">
-        <a:scrgbClr r="0" g="0" b="0"/>
-      </a:lnRef>
-      <a:fillRef idx="3">
-        <a:scrgbClr r="0" g="0" b="0"/>
-      </a:fillRef>
-      <a:effectRef idx="1">
-        <a:scrgbClr r="0" g="0" b="0"/>
-      </a:effectRef>
-      <a:fontRef idx="minor">
-        <a:schemeClr val="lt1"/>
-      </a:fontRef>
-    </dgm:style>
-  </dgm:styleLbl>
-  <dgm:styleLbl name="node4">
-    <dgm:scene3d>
-      <a:camera prst="orthographicFront"/>
-      <a:lightRig rig="flat" dir="t"/>
-    </dgm:scene3d>
-    <dgm:sp3d prstMaterial="plastic">
-      <a:bevelT w="120900" h="88900"/>
-      <a:bevelB w="88900" h="31750" prst="angle"/>
-    </dgm:sp3d>
-    <dgm:txPr/>
-    <dgm:style>
-      <a:lnRef idx="0">
-        <a:scrgbClr r="0" g="0" b="0"/>
-      </a:lnRef>
-      <a:fillRef idx="3">
-        <a:scrgbClr r="0" g="0" b="0"/>
-      </a:fillRef>
-      <a:effectRef idx="1">
-        <a:scrgbClr r="0" g="0" b="0"/>
-      </a:effectRef>
-      <a:fontRef idx="minor">
-        <a:schemeClr val="lt1"/>
-      </a:fontRef>
-    </dgm:style>
-  </dgm:styleLbl>
-  <dgm:styleLbl name="fgImgPlace1">
-    <dgm:scene3d>
-      <a:camera prst="orthographicFront"/>
-      <a:lightRig rig="flat" dir="t"/>
-    </dgm:scene3d>
-    <dgm:sp3d z="127000" prstMaterial="plastic">
-      <a:bevelT w="88900" h="88900"/>
-      <a:bevelB w="88900" h="31750" prst="angle"/>
-    </dgm:sp3d>
-    <dgm:txPr/>
-    <dgm:style>
-      <a:lnRef idx="0">
-        <a:scrgbClr r="0" g="0" b="0"/>
-      </a:lnRef>
-      <a:fillRef idx="3">
-        <a:scrgbClr r="0" g="0" b="0"/>
-      </a:fillRef>
-      <a:effectRef idx="2">
-        <a:scrgbClr r="0" g="0" b="0"/>
-      </a:effectRef>
-      <a:fontRef idx="minor"/>
-    </dgm:style>
-  </dgm:styleLbl>
-  <dgm:styleLbl name="alignImgPlace1">
-    <dgm:scene3d>
-      <a:camera prst="orthographicFront"/>
-      <a:lightRig rig="flat" dir="t"/>
-    </dgm:scene3d>
-    <dgm:sp3d prstMaterial="plastic">
-      <a:bevelT w="88900" h="88900"/>
-      <a:bevelB w="88900" h="31750" prst="angle"/>
-    </dgm:sp3d>
-    <dgm:txPr/>
-    <dgm:style>
-      <a:lnRef idx="0">
-        <a:scrgbClr r="0" g="0" b="0"/>
-      </a:lnRef>
-      <a:fillRef idx="3">
-        <a:scrgbClr r="0" g="0" b="0"/>
-      </a:fillRef>
-      <a:effectRef idx="2">
-        <a:scrgbClr r="0" g="0" b="0"/>
-      </a:effectRef>
-      <a:fontRef idx="minor"/>
-    </dgm:style>
-  </dgm:styleLbl>
-  <dgm:styleLbl name="bgImgPlace1">
-    <dgm:scene3d>
-      <a:camera prst="orthographicFront"/>
-      <a:lightRig rig="flat" dir="t"/>
-    </dgm:scene3d>
-    <dgm:sp3d z="-190500" prstMaterial="plastic">
-      <a:bevelT w="88900" h="88900"/>
-      <a:bevelB w="88900" h="31750" prst="angle"/>
-    </dgm:sp3d>
-    <dgm:txPr/>
-    <dgm:style>
-      <a:lnRef idx="0">
-        <a:scrgbClr r="0" g="0" b="0"/>
-      </a:lnRef>
-      <a:fillRef idx="3">
-        <a:scrgbClr r="0" g="0" b="0"/>
-      </a:fillRef>
-      <a:effectRef idx="2">
-        <a:scrgbClr r="0" g="0" b="0"/>
-      </a:effectRef>
-      <a:fontRef idx="minor"/>
-    </dgm:style>
-  </dgm:styleLbl>
-  <dgm:styleLbl name="sibTrans2D1">
-    <dgm:scene3d>
-      <a:camera prst="orthographicFront"/>
-      <a:lightRig rig="flat" dir="t"/>
-    </dgm:scene3d>
-    <dgm:sp3d z="-80000" prstMaterial="plastic">
-      <a:bevelT w="50800" h="50800"/>
-      <a:bevelB w="25400" h="25400" prst="angle"/>
-    </dgm:sp3d>
-    <dgm:txPr/>
-    <dgm:style>
-      <a:lnRef idx="0">
-        <a:scrgbClr r="0" g="0" b="0"/>
-      </a:lnRef>
-      <a:fillRef idx="3">
-        <a:scrgbClr r="0" g="0" b="0"/>
-      </a:fillRef>
-      <a:effectRef idx="2">
-        <a:scrgbClr r="0" g="0" b="0"/>
-      </a:effectRef>
-      <a:fontRef idx="minor">
-        <a:schemeClr val="lt1"/>
-      </a:fontRef>
-    </dgm:style>
-  </dgm:styleLbl>
-  <dgm:styleLbl name="fgSibTrans2D1">
-    <dgm:scene3d>
-      <a:camera prst="orthographicFront"/>
-      <a:lightRig rig="flat" dir="t"/>
-    </dgm:scene3d>
-    <dgm:sp3d z="127000" prstMaterial="plastic">
-      <a:bevelT w="50800" h="50800"/>
-      <a:bevelB w="25400" h="25400" prst="angle"/>
-    </dgm:sp3d>
-    <dgm:txPr/>
-    <dgm:style>
-      <a:lnRef idx="0">
-        <a:scrgbClr r="0" g="0" b="0"/>
-      </a:lnRef>
-      <a:fillRef idx="3">
-        <a:scrgbClr r="0" g="0" b="0"/>
-      </a:fillRef>
-      <a:effectRef idx="2">
-        <a:scrgbClr r="0" g="0" b="0"/>
-      </a:effectRef>
-      <a:fontRef idx="minor">
-        <a:schemeClr val="lt1"/>
-      </a:fontRef>
-    </dgm:style>
-  </dgm:styleLbl>
-  <dgm:styleLbl name="bgSibTrans2D1">
-    <dgm:scene3d>
-      <a:camera prst="orthographicFront"/>
-      <a:lightRig rig="flat" dir="t"/>
-    </dgm:scene3d>
-    <dgm:sp3d z="-190500" prstMaterial="plastic">
-      <a:bevelT w="50800" h="50800"/>
-      <a:bevelB w="25400" h="25400" prst="angle"/>
-    </dgm:sp3d>
-    <dgm:txPr/>
-    <dgm:style>
-      <a:lnRef idx="0">
-        <a:scrgbClr r="0" g="0" b="0"/>
-      </a:lnRef>
-      <a:fillRef idx="3">
-        <a:scrgbClr r="0" g="0" b="0"/>
-      </a:fillRef>
-      <a:effectRef idx="2">
-        <a:scrgbClr r="0" g="0" b="0"/>
-      </a:effectRef>
-      <a:fontRef idx="minor">
-        <a:schemeClr val="lt1"/>
-      </a:fontRef>
-    </dgm:style>
-  </dgm:styleLbl>
-  <dgm:styleLbl name="sibTrans1D1">
-    <dgm:scene3d>
-      <a:camera prst="orthographicFront"/>
-      <a:lightRig rig="flat" dir="t"/>
-    </dgm:scene3d>
-    <dgm:sp3d z="-40000" prstMaterial="matte"/>
-    <dgm:txPr/>
-    <dgm:style>
-      <a:lnRef idx="1">
-        <a:scrgbClr r="0" g="0" b="0"/>
-      </a:lnRef>
-      <a:fillRef idx="0">
-        <a:scrgbClr r="0" g="0" b="0"/>
-      </a:fillRef>
-      <a:effectRef idx="0">
-        <a:scrgbClr r="0" g="0" b="0"/>
-      </a:effectRef>
-      <a:fontRef idx="minor"/>
-    </dgm:style>
-  </dgm:styleLbl>
-  <dgm:styleLbl name="callout">
-    <dgm:scene3d>
-      <a:camera prst="orthographicFront"/>
-      <a:lightRig rig="threePt" dir="t"/>
-    </dgm:scene3d>
-    <dgm:sp3d z="127000" prstMaterial="matte"/>
-    <dgm:txPr/>
-    <dgm:style>
-      <a:lnRef idx="2">
-        <a:scrgbClr r="0" g="0" b="0"/>
-      </a:lnRef>
-      <a:fillRef idx="1">
-        <a:scrgbClr r="0" g="0" b="0"/>
-      </a:fillRef>
-      <a:effectRef idx="0">
-        <a:scrgbClr r="0" g="0" b="0"/>
-      </a:effectRef>
-      <a:fontRef idx="minor"/>
-    </dgm:style>
-  </dgm:styleLbl>
-  <dgm:styleLbl name="asst0">
-    <dgm:scene3d>
-      <a:camera prst="orthographicFront"/>
-      <a:lightRig rig="flat" dir="t"/>
-    </dgm:scene3d>
-    <dgm:sp3d prstMaterial="plastic">
-      <a:bevelT w="120900" h="88900"/>
-      <a:bevelB w="88900" h="31750" prst="angle"/>
-    </dgm:sp3d>
-    <dgm:txPr/>
-    <dgm:style>
-      <a:lnRef idx="0">
-        <a:scrgbClr r="0" g="0" b="0"/>
-      </a:lnRef>
-      <a:fillRef idx="3">
-        <a:scrgbClr r="0" g="0" b="0"/>
-      </a:fillRef>
-      <a:effectRef idx="1">
-        <a:scrgbClr r="0" g="0" b="0"/>
-      </a:effectRef>
-      <a:fontRef idx="minor">
-        <a:schemeClr val="lt1"/>
-      </a:fontRef>
-    </dgm:style>
-  </dgm:styleLbl>
-  <dgm:styleLbl name="asst1">
-    <dgm:scene3d>
-      <a:camera prst="orthographicFront"/>
-      <a:lightRig rig="flat" dir="t"/>
-    </dgm:scene3d>
-    <dgm:sp3d prstMaterial="plastic">
-      <a:bevelT w="120900" h="88900"/>
-      <a:bevelB w="88900" h="31750" prst="angle"/>
-    </dgm:sp3d>
-    <dgm:txPr/>
-    <dgm:style>
-      <a:lnRef idx="0">
-        <a:scrgbClr r="0" g="0" b="0"/>
-      </a:lnRef>
-      <a:fillRef idx="3">
-        <a:scrgbClr r="0" g="0" b="0"/>
-      </a:fillRef>
-      <a:effectRef idx="1">
-        <a:scrgbClr r="0" g="0" b="0"/>
-      </a:effectRef>
-      <a:fontRef idx="minor">
-        <a:schemeClr val="lt1"/>
-      </a:fontRef>
-    </dgm:style>
-  </dgm:styleLbl>
-  <dgm:styleLbl name="asst2">
-    <dgm:scene3d>
-      <a:camera prst="orthographicFront"/>
-      <a:lightRig rig="flat" dir="t"/>
-    </dgm:scene3d>
-    <dgm:sp3d prstMaterial="plastic">
-      <a:bevelT w="120900" h="88900"/>
-      <a:bevelB w="88900" h="31750" prst="angle"/>
-    </dgm:sp3d>
-    <dgm:txPr/>
-    <dgm:style>
-      <a:lnRef idx="0">
-        <a:scrgbClr r="0" g="0" b="0"/>
-      </a:lnRef>
-      <a:fillRef idx="3">
-        <a:scrgbClr r="0" g="0" b="0"/>
-      </a:fillRef>
-      <a:effectRef idx="1">
-        <a:scrgbClr r="0" g="0" b="0"/>
-      </a:effectRef>
-      <a:fontRef idx="minor">
-        <a:schemeClr val="lt1"/>
-      </a:fontRef>
-    </dgm:style>
-  </dgm:styleLbl>
-  <dgm:styleLbl name="asst3">
-    <dgm:scene3d>
-      <a:camera prst="orthographicFront"/>
-      <a:lightRig rig="flat" dir="t"/>
-    </dgm:scene3d>
-    <dgm:sp3d prstMaterial="plastic">
-      <a:bevelT w="120900" h="88900"/>
-      <a:bevelB w="88900" h="31750" prst="angle"/>
-    </dgm:sp3d>
-    <dgm:txPr/>
-    <dgm:style>
-      <a:lnRef idx="0">
-        <a:scrgbClr r="0" g="0" b="0"/>
-      </a:lnRef>
-      <a:fillRef idx="3">
-        <a:scrgbClr r="0" g="0" b="0"/>
-      </a:fillRef>
-      <a:effectRef idx="1">
-        <a:scrgbClr r="0" g="0" b="0"/>
-      </a:effectRef>
-      <a:fontRef idx="minor">
-        <a:schemeClr val="lt1"/>
-      </a:fontRef>
-    </dgm:style>
-  </dgm:styleLbl>
-  <dgm:styleLbl name="parChTrans2D1">
-    <dgm:scene3d>
-      <a:camera prst="orthographicFront"/>
-      <a:lightRig rig="flat" dir="t"/>
-    </dgm:scene3d>
-    <dgm:sp3d z="-100000" prstMaterial="plastic">
-      <a:bevelT w="120900" h="88900"/>
-      <a:bevelB w="88900" h="31750" prst="angle"/>
-    </dgm:sp3d>
-    <dgm:txPr/>
-    <dgm:style>
-      <a:lnRef idx="0">
-        <a:scrgbClr r="0" g="0" b="0"/>
-      </a:lnRef>
-      <a:fillRef idx="3">
-        <a:scrgbClr r="0" g="0" b="0"/>
-      </a:fillRef>
-      <a:effectRef idx="1">
-        <a:scrgbClr r="0" g="0" b="0"/>
-      </a:effectRef>
-      <a:fontRef idx="minor">
-        <a:schemeClr val="lt1"/>
-      </a:fontRef>
-    </dgm:style>
-  </dgm:styleLbl>
-  <dgm:styleLbl name="parChTrans2D2">
-    <dgm:scene3d>
-      <a:camera prst="orthographicFront"/>
-      <a:lightRig rig="flat" dir="t"/>
-    </dgm:scene3d>
-    <dgm:sp3d z="-60000" prstMaterial="plastic">
-      <a:bevelT w="120900" h="88900"/>
-      <a:bevelB w="88900" h="31750" prst="angle"/>
-    </dgm:sp3d>
-    <dgm:txPr/>
-    <dgm:style>
-      <a:lnRef idx="0">
-        <a:scrgbClr r="0" g="0" b="0"/>
-      </a:lnRef>
-      <a:fillRef idx="3">
-        <a:scrgbClr r="0" g="0" b="0"/>
-      </a:fillRef>
-      <a:effectRef idx="1">
-        <a:scrgbClr r="0" g="0" b="0"/>
-      </a:effectRef>
-      <a:fontRef idx="minor">
-        <a:schemeClr val="lt1"/>
-      </a:fontRef>
-    </dgm:style>
-  </dgm:styleLbl>
-  <dgm:styleLbl name="parChTrans2D3">
-    <dgm:scene3d>
-      <a:camera prst="orthographicFront"/>
-      <a:lightRig rig="flat" dir="t"/>
-    </dgm:scene3d>
-    <dgm:sp3d z="-60000" prstMaterial="plastic">
-      <a:bevelT w="120900" h="88900"/>
-      <a:bevelB w="88900" h="31750" prst="angle"/>
-    </dgm:sp3d>
-    <dgm:txPr/>
-    <dgm:style>
-      <a:lnRef idx="0">
-        <a:scrgbClr r="0" g="0" b="0"/>
-      </a:lnRef>
-      <a:fillRef idx="3">
-        <a:scrgbClr r="0" g="0" b="0"/>
-      </a:fillRef>
-      <a:effectRef idx="1">
-        <a:scrgbClr r="0" g="0" b="0"/>
-      </a:effectRef>
-      <a:fontRef idx="minor">
-        <a:schemeClr val="lt1"/>
-      </a:fontRef>
-    </dgm:style>
-  </dgm:styleLbl>
-  <dgm:styleLbl name="parChTrans2D4">
-    <dgm:scene3d>
-      <a:camera prst="orthographicFront"/>
-      <a:lightRig rig="flat" dir="t"/>
-    </dgm:scene3d>
-    <dgm:sp3d z="-60000" prstMaterial="plastic">
-      <a:bevelT w="120900" h="88900"/>
-      <a:bevelB w="88900" h="31750" prst="angle"/>
-    </dgm:sp3d>
-    <dgm:txPr/>
-    <dgm:style>
-      <a:lnRef idx="0">
-        <a:scrgbClr r="0" g="0" b="0"/>
-      </a:lnRef>
-      <a:fillRef idx="3">
-        <a:scrgbClr r="0" g="0" b="0"/>
-      </a:fillRef>
-      <a:effectRef idx="1">
-        <a:scrgbClr r="0" g="0" b="0"/>
-      </a:effectRef>
-      <a:fontRef idx="minor">
-        <a:schemeClr val="lt1"/>
-      </a:fontRef>
-    </dgm:style>
-  </dgm:styleLbl>
-  <dgm:styleLbl name="parChTrans1D1">
-    <dgm:scene3d>
-      <a:camera prst="orthographicFront"/>
-      <a:lightRig rig="flat" dir="t"/>
-    </dgm:scene3d>
-    <dgm:sp3d prstMaterial="matte"/>
-    <dgm:txPr/>
-    <dgm:style>
-      <a:lnRef idx="2">
-        <a:scrgbClr r="0" g="0" b="0"/>
-      </a:lnRef>
-      <a:fillRef idx="0">
-        <a:scrgbClr r="0" g="0" b="0"/>
-      </a:fillRef>
-      <a:effectRef idx="0">
-        <a:scrgbClr r="0" g="0" b="0"/>
-      </a:effectRef>
-      <a:fontRef idx="minor"/>
-    </dgm:style>
-  </dgm:styleLbl>
-  <dgm:styleLbl name="parChTrans1D2">
-    <dgm:scene3d>
-      <a:camera prst="orthographicFront"/>
-      <a:lightRig rig="flat" dir="t"/>
-    </dgm:scene3d>
-    <dgm:sp3d prstMaterial="matte"/>
-    <dgm:txPr/>
-    <dgm:style>
-      <a:lnRef idx="2">
-        <a:scrgbClr r="0" g="0" b="0"/>
-      </a:lnRef>
-      <a:fillRef idx="0">
-        <a:scrgbClr r="0" g="0" b="0"/>
-      </a:fillRef>
-      <a:effectRef idx="0">
-        <a:scrgbClr r="0" g="0" b="0"/>
-      </a:effectRef>
-      <a:fontRef idx="minor"/>
-    </dgm:style>
-  </dgm:styleLbl>
-  <dgm:styleLbl name="parChTrans1D3">
-    <dgm:scene3d>
-      <a:camera prst="orthographicFront"/>
-      <a:lightRig rig="flat" dir="t"/>
-    </dgm:scene3d>
-    <dgm:sp3d prstMaterial="matte"/>
-    <dgm:txPr/>
-    <dgm:style>
-      <a:lnRef idx="2">
-        <a:scrgbClr r="0" g="0" b="0"/>
-      </a:lnRef>
-      <a:fillRef idx="0">
-        <a:scrgbClr r="0" g="0" b="0"/>
-      </a:fillRef>
-      <a:effectRef idx="0">
-        <a:scrgbClr r="0" g="0" b="0"/>
-      </a:effectRef>
-      <a:fontRef idx="minor"/>
-    </dgm:style>
-  </dgm:styleLbl>
-  <dgm:styleLbl name="parChTrans1D4">
-    <dgm:scene3d>
-      <a:camera prst="orthographicFront"/>
-      <a:lightRig rig="flat" dir="t"/>
-    </dgm:scene3d>
-    <dgm:sp3d prstMaterial="matte"/>
-    <dgm:txPr/>
-    <dgm:style>
-      <a:lnRef idx="2">
-        <a:scrgbClr r="0" g="0" b="0"/>
-      </a:lnRef>
-      <a:fillRef idx="0">
-        <a:scrgbClr r="0" g="0" b="0"/>
-      </a:fillRef>
-      <a:effectRef idx="0">
-        <a:scrgbClr r="0" g="0" b="0"/>
-      </a:effectRef>
-      <a:fontRef idx="minor"/>
-    </dgm:style>
-  </dgm:styleLbl>
-  <dgm:styleLbl name="fgAcc1">
-    <dgm:scene3d>
-      <a:camera prst="orthographicFront"/>
-      <a:lightRig rig="flat" dir="t"/>
-    </dgm:scene3d>
-    <dgm:sp3d z="190500" extrusionH="12700" prstMaterial="plastic">
-      <a:bevelT w="50800" h="50800"/>
-    </dgm:sp3d>
-    <dgm:txPr/>
-    <dgm:style>
-      <a:lnRef idx="1">
-        <a:scrgbClr r="0" g="0" b="0"/>
-      </a:lnRef>
-      <a:fillRef idx="1">
-        <a:scrgbClr r="0" g="0" b="0"/>
-      </a:fillRef>
-      <a:effectRef idx="2">
-        <a:scrgbClr r="0" g="0" b="0"/>
-      </a:effectRef>
-      <a:fontRef idx="minor"/>
-    </dgm:style>
-  </dgm:styleLbl>
-  <dgm:styleLbl name="conFgAcc1">
-    <dgm:scene3d>
-      <a:camera prst="orthographicFront"/>
-      <a:lightRig rig="flat" dir="t"/>
-    </dgm:scene3d>
-    <dgm:sp3d z="190500" extrusionH="12700" prstMaterial="plastic">
-      <a:bevelT w="50800" h="50800"/>
-    </dgm:sp3d>
-    <dgm:txPr/>
-    <dgm:style>
-      <a:lnRef idx="1">
-        <a:scrgbClr r="0" g="0" b="0"/>
-      </a:lnRef>
-      <a:fillRef idx="1">
-        <a:scrgbClr r="0" g="0" b="0"/>
-      </a:fillRef>
-      <a:effectRef idx="2">
-        <a:scrgbClr r="0" g="0" b="0"/>
-      </a:effectRef>
-      <a:fontRef idx="minor"/>
-    </dgm:style>
-  </dgm:styleLbl>
-  <dgm:styleLbl name="alignAcc1">
-    <dgm:scene3d>
-      <a:camera prst="orthographicFront"/>
-      <a:lightRig rig="flat" dir="t"/>
-    </dgm:scene3d>
-    <dgm:sp3d extrusionH="12700" prstMaterial="plastic">
-      <a:bevelT w="50800" h="50800"/>
-    </dgm:sp3d>
-    <dgm:txPr/>
-    <dgm:style>
-      <a:lnRef idx="1">
-        <a:scrgbClr r="0" g="0" b="0"/>
-      </a:lnRef>
-      <a:fillRef idx="1">
-        <a:scrgbClr r="0" g="0" b="0"/>
-      </a:fillRef>
-      <a:effectRef idx="2">
-        <a:scrgbClr r="0" g="0" b="0"/>
-      </a:effectRef>
-      <a:fontRef idx="minor"/>
-    </dgm:style>
-  </dgm:styleLbl>
-  <dgm:styleLbl name="trAlignAcc1">
-    <dgm:scene3d>
-      <a:camera prst="orthographicFront"/>
-      <a:lightRig rig="flat" dir="t"/>
-    </dgm:scene3d>
-    <dgm:sp3d extrusionH="12700" prstMaterial="plastic">
-      <a:bevelT w="50800" h="50800"/>
-    </dgm:sp3d>
-    <dgm:txPr/>
-    <dgm:style>
-      <a:lnRef idx="1">
-        <a:scrgbClr r="0" g="0" b="0"/>
-      </a:lnRef>
-      <a:fillRef idx="1">
-        <a:scrgbClr r="0" g="0" b="0"/>
-      </a:fillRef>
-      <a:effectRef idx="2">
-        <a:scrgbClr r="0" g="0" b="0"/>
-      </a:effectRef>
-      <a:fontRef idx="minor"/>
-    </dgm:style>
-  </dgm:styleLbl>
-  <dgm:styleLbl name="bgAcc1">
-    <dgm:scene3d>
-      <a:camera prst="orthographicFront"/>
-      <a:lightRig rig="flat" dir="t"/>
-    </dgm:scene3d>
-    <dgm:sp3d z="-190500" extrusionH="12700" prstMaterial="plastic">
-      <a:bevelT w="50800" h="50800"/>
-    </dgm:sp3d>
-    <dgm:txPr/>
-    <dgm:style>
-      <a:lnRef idx="1">
-        <a:scrgbClr r="0" g="0" b="0"/>
-      </a:lnRef>
-      <a:fillRef idx="1">
-        <a:scrgbClr r="0" g="0" b="0"/>
-      </a:fillRef>
-      <a:effectRef idx="2">
-        <a:scrgbClr r="0" g="0" b="0"/>
-      </a:effectRef>
-      <a:fontRef idx="minor"/>
-    </dgm:style>
-  </dgm:styleLbl>
-  <dgm:styleLbl name="solidFgAcc1">
-    <dgm:scene3d>
-      <a:camera prst="orthographicFront"/>
-      <a:lightRig rig="flat" dir="t"/>
-    </dgm:scene3d>
-    <dgm:sp3d z="190500" extrusionH="12700" prstMaterial="plastic">
-      <a:bevelT w="50800" h="50800"/>
-    </dgm:sp3d>
-    <dgm:txPr/>
-    <dgm:style>
-      <a:lnRef idx="1">
-        <a:scrgbClr r="0" g="0" b="0"/>
-      </a:lnRef>
-      <a:fillRef idx="1">
-        <a:scrgbClr r="0" g="0" b="0"/>
-      </a:fillRef>
-      <a:effectRef idx="2">
-        <a:scrgbClr r="0" g="0" b="0"/>
-      </a:effectRef>
-      <a:fontRef idx="minor"/>
-    </dgm:style>
-  </dgm:styleLbl>
-  <dgm:styleLbl name="solidAlignAcc1">
-    <dgm:scene3d>
-      <a:camera prst="orthographicFront"/>
-      <a:lightRig rig="flat" dir="t"/>
-    </dgm:scene3d>
-    <dgm:sp3d extrusionH="12700" prstMaterial="plastic">
-      <a:bevelT w="50800" h="50800"/>
-    </dgm:sp3d>
-    <dgm:txPr/>
-    <dgm:style>
-      <a:lnRef idx="1">
-        <a:scrgbClr r="0" g="0" b="0"/>
-      </a:lnRef>
-      <a:fillRef idx="1">
-        <a:scrgbClr r="0" g="0" b="0"/>
-      </a:fillRef>
-      <a:effectRef idx="2">
-        <a:scrgbClr r="0" g="0" b="0"/>
-      </a:effectRef>
-      <a:fontRef idx="minor"/>
-    </dgm:style>
-  </dgm:styleLbl>
-  <dgm:styleLbl name="solidBgAcc1">
-    <dgm:scene3d>
-      <a:camera prst="orthographicFront"/>
-      <a:lightRig rig="flat" dir="t"/>
-    </dgm:scene3d>
-    <dgm:sp3d z="-190500" extrusionH="12700" prstMaterial="plastic">
-      <a:bevelT w="50800" h="50800"/>
-    </dgm:sp3d>
-    <dgm:txPr/>
-    <dgm:style>
-      <a:lnRef idx="1">
-        <a:scrgbClr r="0" g="0" b="0"/>
-      </a:lnRef>
-      <a:fillRef idx="1">
-        <a:scrgbClr r="0" g="0" b="0"/>
-      </a:fillRef>
-      <a:effectRef idx="2">
-        <a:scrgbClr r="0" g="0" b="0"/>
-      </a:effectRef>
-      <a:fontRef idx="minor"/>
-    </dgm:style>
-  </dgm:styleLbl>
-  <dgm:styleLbl name="fgAccFollowNode1">
-    <dgm:scene3d>
-      <a:camera prst="orthographicFront"/>
-      <a:lightRig rig="flat" dir="t"/>
-    </dgm:scene3d>
-    <dgm:sp3d z="190500" extrusionH="12700" prstMaterial="plastic">
-      <a:bevelT w="50800" h="50800"/>
-    </dgm:sp3d>
-    <dgm:txPr/>
-    <dgm:style>
-      <a:lnRef idx="1">
-        <a:scrgbClr r="0" g="0" b="0"/>
-      </a:lnRef>
-      <a:fillRef idx="1">
-        <a:scrgbClr r="0" g="0" b="0"/>
-      </a:fillRef>
-      <a:effectRef idx="2">
-        <a:scrgbClr r="0" g="0" b="0"/>
-      </a:effectRef>
-      <a:fontRef idx="minor"/>
-    </dgm:style>
-  </dgm:styleLbl>
-  <dgm:styleLbl name="alignAccFollowNode1">
-    <dgm:scene3d>
-      <a:camera prst="orthographicFront"/>
-      <a:lightRig rig="flat" dir="t"/>
-    </dgm:scene3d>
-    <dgm:sp3d extrusionH="12700" prstMaterial="plastic">
-      <a:bevelT w="50800" h="50800"/>
-    </dgm:sp3d>
-    <dgm:txPr/>
-    <dgm:style>
-      <a:lnRef idx="1">
-        <a:scrgbClr r="0" g="0" b="0"/>
-      </a:lnRef>
-      <a:fillRef idx="1">
-        <a:scrgbClr r="0" g="0" b="0"/>
-      </a:fillRef>
-      <a:effectRef idx="2">
-        <a:scrgbClr r="0" g="0" b="0"/>
-      </a:effectRef>
-      <a:fontRef idx="minor"/>
-    </dgm:style>
-  </dgm:styleLbl>
-  <dgm:styleLbl name="bgAccFollowNode1">
-    <dgm:scene3d>
-      <a:camera prst="orthographicFront"/>
-      <a:lightRig rig="flat" dir="t"/>
-    </dgm:scene3d>
-    <dgm:sp3d z="-190500" extrusionH="12700" prstMaterial="plastic">
-      <a:bevelT w="50800" h="50800"/>
-    </dgm:sp3d>
-    <dgm:txPr/>
-    <dgm:style>
-      <a:lnRef idx="1">
-        <a:scrgbClr r="0" g="0" b="0"/>
-      </a:lnRef>
-      <a:fillRef idx="1">
-        <a:scrgbClr r="0" g="0" b="0"/>
-      </a:fillRef>
-      <a:effectRef idx="2">
-        <a:scrgbClr r="0" g="0" b="0"/>
-      </a:effectRef>
-      <a:fontRef idx="minor"/>
-    </dgm:style>
-  </dgm:styleLbl>
-  <dgm:styleLbl name="fgAcc0">
-    <dgm:scene3d>
-      <a:camera prst="orthographicFront"/>
-      <a:lightRig rig="flat" dir="t"/>
-    </dgm:scene3d>
-    <dgm:sp3d z="190500" extrusionH="12700" prstMaterial="plastic">
-      <a:bevelT w="50800" h="50800"/>
-    </dgm:sp3d>
-    <dgm:txPr/>
-    <dgm:style>
-      <a:lnRef idx="1">
-        <a:scrgbClr r="0" g="0" b="0"/>
-      </a:lnRef>
-      <a:fillRef idx="1">
-        <a:scrgbClr r="0" g="0" b="0"/>
-      </a:fillRef>
-      <a:effectRef idx="2">
-        <a:scrgbClr r="0" g="0" b="0"/>
-      </a:effectRef>
-      <a:fontRef idx="minor"/>
-    </dgm:style>
-  </dgm:styleLbl>
-  <dgm:styleLbl name="fgAcc2">
-    <dgm:scene3d>
-      <a:camera prst="orthographicFront"/>
-      <a:lightRig rig="flat" dir="t"/>
-    </dgm:scene3d>
-    <dgm:sp3d z="190500" extrusionH="12700" prstMaterial="plastic">
-      <a:bevelT w="50800" h="50800"/>
-    </dgm:sp3d>
-    <dgm:txPr/>
-    <dgm:style>
-      <a:lnRef idx="1">
-        <a:scrgbClr r="0" g="0" b="0"/>
-      </a:lnRef>
-      <a:fillRef idx="1">
-        <a:scrgbClr r="0" g="0" b="0"/>
-      </a:fillRef>
-      <a:effectRef idx="2">
-        <a:scrgbClr r="0" g="0" b="0"/>
-      </a:effectRef>
-      <a:fontRef idx="minor"/>
-    </dgm:style>
-  </dgm:styleLbl>
-  <dgm:styleLbl name="fgAcc3">
-    <dgm:scene3d>
-      <a:camera prst="orthographicFront"/>
-      <a:lightRig rig="flat" dir="t"/>
-    </dgm:scene3d>
-    <dgm:sp3d z="190500" extrusionH="12700" prstMaterial="plastic">
-      <a:bevelT w="50800" h="50800"/>
-    </dgm:sp3d>
-    <dgm:txPr/>
-    <dgm:style>
-      <a:lnRef idx="1">
-        <a:scrgbClr r="0" g="0" b="0"/>
-      </a:lnRef>
-      <a:fillRef idx="1">
-        <a:scrgbClr r="0" g="0" b="0"/>
-      </a:fillRef>
-      <a:effectRef idx="2">
-        <a:scrgbClr r="0" g="0" b="0"/>
-      </a:effectRef>
-      <a:fontRef idx="minor"/>
-    </dgm:style>
-  </dgm:styleLbl>
-  <dgm:styleLbl name="fgAcc4">
-    <dgm:scene3d>
-      <a:camera prst="orthographicFront"/>
-      <a:lightRig rig="flat" dir="t"/>
-    </dgm:scene3d>
-    <dgm:sp3d z="190500" extrusionH="12700" prstMaterial="plastic">
-      <a:bevelT w="50800" h="50800"/>
-    </dgm:sp3d>
-    <dgm:txPr/>
-    <dgm:style>
-      <a:lnRef idx="1">
-        <a:scrgbClr r="0" g="0" b="0"/>
-      </a:lnRef>
-      <a:fillRef idx="1">
-        <a:scrgbClr r="0" g="0" b="0"/>
-      </a:fillRef>
-      <a:effectRef idx="2">
-        <a:scrgbClr r="0" g="0" b="0"/>
-      </a:effectRef>
-      <a:fontRef idx="minor"/>
-    </dgm:style>
-  </dgm:styleLbl>
-  <dgm:styleLbl name="bgShp">
-    <dgm:scene3d>
-      <a:camera prst="orthographicFront"/>
-      <a:lightRig rig="flat" dir="t"/>
-    </dgm:scene3d>
-    <dgm:sp3d z="-190500" extrusionH="12700" prstMaterial="plastic">
-      <a:bevelT w="50800" h="50800"/>
-    </dgm:sp3d>
-    <dgm:txPr/>
-    <dgm:style>
-      <a:lnRef idx="0">
-        <a:scrgbClr r="0" g="0" b="0"/>
-      </a:lnRef>
-      <a:fillRef idx="3">
-        <a:scrgbClr r="0" g="0" b="0"/>
-      </a:fillRef>
-      <a:effectRef idx="0">
-        <a:scrgbClr r="0" g="0" b="0"/>
-      </a:effectRef>
-      <a:fontRef idx="minor"/>
-    </dgm:style>
-  </dgm:styleLbl>
-  <dgm:styleLbl name="dkBgShp">
-    <dgm:scene3d>
-      <a:camera prst="orthographicFront"/>
-      <a:lightRig rig="flat" dir="t"/>
-    </dgm:scene3d>
-    <dgm:sp3d z="-190500" extrusionH="12700" prstMaterial="plastic">
-      <a:bevelT w="50800" h="50800"/>
-    </dgm:sp3d>
-    <dgm:txPr/>
-    <dgm:style>
-      <a:lnRef idx="0">
-        <a:scrgbClr r="0" g="0" b="0"/>
-      </a:lnRef>
-      <a:fillRef idx="2">
-        <a:scrgbClr r="0" g="0" b="0"/>
-      </a:fillRef>
-      <a:effectRef idx="0">
-        <a:scrgbClr r="0" g="0" b="0"/>
-      </a:effectRef>
-      <a:fontRef idx="minor"/>
-    </dgm:style>
-  </dgm:styleLbl>
-  <dgm:styleLbl name="trBgShp">
-    <dgm:scene3d>
-      <a:camera prst="orthographicFront"/>
-      <a:lightRig rig="flat" dir="t"/>
-    </dgm:scene3d>
-    <dgm:sp3d z="-190500" extrusionH="12700" prstMaterial="matte"/>
-    <dgm:txPr/>
-    <dgm:style>
-      <a:lnRef idx="0">
-        <a:scrgbClr r="0" g="0" b="0"/>
-      </a:lnRef>
-      <a:fillRef idx="1">
-        <a:scrgbClr r="0" g="0" b="0"/>
-      </a:fillRef>
-      <a:effectRef idx="0">
-        <a:scrgbClr r="0" g="0" b="0"/>
-      </a:effectRef>
-      <a:fontRef idx="minor"/>
-    </dgm:style>
-  </dgm:styleLbl>
-  <dgm:styleLbl name="fgShp">
-    <dgm:scene3d>
-      <a:camera prst="orthographicFront"/>
-      <a:lightRig rig="flat" dir="t"/>
-    </dgm:scene3d>
-    <dgm:sp3d z="190500" prstMaterial="plastic">
-      <a:bevelT w="120900" h="88900"/>
-      <a:bevelB w="88900" h="31750" prst="angle"/>
-    </dgm:sp3d>
-    <dgm:txPr/>
-    <dgm:style>
-      <a:lnRef idx="0">
-        <a:scrgbClr r="0" g="0" b="0"/>
-      </a:lnRef>
-      <a:fillRef idx="1">
-        <a:scrgbClr r="0" g="0" b="0"/>
-      </a:fillRef>
-      <a:effectRef idx="3">
-        <a:scrgbClr r="0" g="0" b="0"/>
-      </a:effectRef>
-      <a:fontRef idx="minor">
-        <a:schemeClr val="lt1"/>
-      </a:fontRef>
-    </dgm:style>
-  </dgm:styleLbl>
-  <dgm:styleLbl name="revTx">
-    <dgm:scene3d>
-      <a:camera prst="orthographicFront"/>
-      <a:lightRig rig="threePt" dir="t"/>
-    </dgm:scene3d>
-    <dgm:sp3d/>
-    <dgm:txPr/>
-    <dgm:style>
-      <a:lnRef idx="0">
-        <a:scrgbClr r="0" g="0" b="0"/>
-      </a:lnRef>
-      <a:fillRef idx="0">
-        <a:scrgbClr r="0" g="0" b="0"/>
-      </a:fillRef>
-      <a:effectRef idx="0">
-        <a:scrgbClr r="0" g="0" b="0"/>
-      </a:effectRef>
-      <a:fontRef idx="minor"/>
-    </dgm:style>
-  </dgm:styleLbl>
-</dgm:styleDef>
-</file>
-
 <file path=ppt/notesMasters/notesMaster1.xml><?xml version="1.0" encoding="utf-8"?>
 <p:notesMaster xmlns:a="http://schemas.openxmlformats.org/drawingml/2006/main" xmlns:r="http://schemas.openxmlformats.org/officeDocument/2006/relationships" xmlns:p="http://schemas.openxmlformats.org/presentationml/2006/main">
   <p:cSld>
@@ -2955,7 +226,7 @@
           <a:p>
             <a:fld id="{AAC35ACC-FA45-4359-B35C-FB53E0CDACF5}" type="datetimeFigureOut">
               <a:rPr lang="en-US" smtClean="0"/>
-              <a:t>4/22/2014</a:t>
+              <a:t>4/29/2014</a:t>
             </a:fld>
             <a:endParaRPr lang="en-US"/>
           </a:p>
@@ -4020,7 +1291,7 @@
           <a:p>
             <a:fld id="{DA7F5214-9081-431C-8856-C5435880AFB9}" type="slidenum">
               <a:rPr lang="en-US" smtClean="0"/>
-              <a:t>31</a:t>
+              <a:t>34</a:t>
             </a:fld>
             <a:endParaRPr lang="en-US"/>
           </a:p>
@@ -4215,7 +1486,7 @@
           <a:p>
             <a:fld id="{28FB72A1-A1D9-4E67-B047-53ABCB749B09}" type="datetimeFigureOut">
               <a:rPr lang="en-US" smtClean="0"/>
-              <a:t>4/22/2014</a:t>
+              <a:t>4/29/2014</a:t>
             </a:fld>
             <a:endParaRPr lang="en-US"/>
           </a:p>
@@ -4392,7 +1663,7 @@
           <a:p>
             <a:fld id="{28FB72A1-A1D9-4E67-B047-53ABCB749B09}" type="datetimeFigureOut">
               <a:rPr lang="en-US" smtClean="0"/>
-              <a:t>4/22/2014</a:t>
+              <a:t>4/29/2014</a:t>
             </a:fld>
             <a:endParaRPr lang="en-US"/>
           </a:p>
@@ -4572,7 +1843,7 @@
           <a:p>
             <a:fld id="{28FB72A1-A1D9-4E67-B047-53ABCB749B09}" type="datetimeFigureOut">
               <a:rPr lang="en-US" smtClean="0"/>
-              <a:t>4/22/2014</a:t>
+              <a:t>4/29/2014</a:t>
             </a:fld>
             <a:endParaRPr lang="en-US"/>
           </a:p>
@@ -4742,7 +2013,7 @@
           <a:p>
             <a:fld id="{28FB72A1-A1D9-4E67-B047-53ABCB749B09}" type="datetimeFigureOut">
               <a:rPr lang="en-US" smtClean="0"/>
-              <a:t>4/22/2014</a:t>
+              <a:t>4/29/2014</a:t>
             </a:fld>
             <a:endParaRPr lang="en-US"/>
           </a:p>
@@ -4995,7 +2266,7 @@
           <a:p>
             <a:fld id="{28FB72A1-A1D9-4E67-B047-53ABCB749B09}" type="datetimeFigureOut">
               <a:rPr lang="en-US" smtClean="0"/>
-              <a:t>4/22/2014</a:t>
+              <a:t>4/29/2014</a:t>
             </a:fld>
             <a:endParaRPr lang="en-US"/>
           </a:p>
@@ -5290,7 +2561,7 @@
           <a:p>
             <a:fld id="{28FB72A1-A1D9-4E67-B047-53ABCB749B09}" type="datetimeFigureOut">
               <a:rPr lang="en-US" smtClean="0"/>
-              <a:t>4/22/2014</a:t>
+              <a:t>4/29/2014</a:t>
             </a:fld>
             <a:endParaRPr lang="en-US"/>
           </a:p>
@@ -5712,7 +2983,7 @@
           <a:p>
             <a:fld id="{28FB72A1-A1D9-4E67-B047-53ABCB749B09}" type="datetimeFigureOut">
               <a:rPr lang="en-US" smtClean="0"/>
-              <a:t>4/22/2014</a:t>
+              <a:t>4/29/2014</a:t>
             </a:fld>
             <a:endParaRPr lang="en-US"/>
           </a:p>
@@ -5830,7 +3101,7 @@
           <a:p>
             <a:fld id="{28FB72A1-A1D9-4E67-B047-53ABCB749B09}" type="datetimeFigureOut">
               <a:rPr lang="en-US" smtClean="0"/>
-              <a:t>4/22/2014</a:t>
+              <a:t>4/29/2014</a:t>
             </a:fld>
             <a:endParaRPr lang="en-US"/>
           </a:p>
@@ -5925,7 +3196,7 @@
           <a:p>
             <a:fld id="{28FB72A1-A1D9-4E67-B047-53ABCB749B09}" type="datetimeFigureOut">
               <a:rPr lang="en-US" smtClean="0"/>
-              <a:t>4/22/2014</a:t>
+              <a:t>4/29/2014</a:t>
             </a:fld>
             <a:endParaRPr lang="en-US"/>
           </a:p>
@@ -6202,7 +3473,7 @@
           <a:p>
             <a:fld id="{28FB72A1-A1D9-4E67-B047-53ABCB749B09}" type="datetimeFigureOut">
               <a:rPr lang="en-US" smtClean="0"/>
-              <a:t>4/22/2014</a:t>
+              <a:t>4/29/2014</a:t>
             </a:fld>
             <a:endParaRPr lang="en-US"/>
           </a:p>
@@ -6459,7 +3730,7 @@
           <a:p>
             <a:fld id="{28FB72A1-A1D9-4E67-B047-53ABCB749B09}" type="datetimeFigureOut">
               <a:rPr lang="en-US" smtClean="0"/>
-              <a:t>4/22/2014</a:t>
+              <a:t>4/29/2014</a:t>
             </a:fld>
             <a:endParaRPr lang="en-US"/>
           </a:p>
@@ -6682,7 +3953,7 @@
           <a:p>
             <a:fld id="{28FB72A1-A1D9-4E67-B047-53ABCB749B09}" type="datetimeFigureOut">
               <a:rPr lang="en-US" smtClean="0"/>
-              <a:t>4/22/2014</a:t>
+              <a:t>4/29/2014</a:t>
             </a:fld>
             <a:endParaRPr lang="en-US"/>
           </a:p>
@@ -7343,7 +4614,7 @@
           <a:p>
             <a:fld id="{7048A604-7B09-4160-B56F-42D5AA5FC5B7}" type="datetime1">
               <a:rPr lang="en-US" smtClean="0"/>
-              <a:t>4/22/2014</a:t>
+              <a:t>4/29/2014</a:t>
             </a:fld>
             <a:endParaRPr lang="en-US"/>
           </a:p>
@@ -10470,12 +7741,12 @@
       </p:grpSpPr>
       <p:sp>
         <p:nvSpPr>
-          <p:cNvPr id="2" name="Subtitle 1"/>
-          <p:cNvSpPr>
-            <a:spLocks noGrp="1"/>
-          </p:cNvSpPr>
-          <p:nvPr>
-            <p:ph type="subTitle" idx="1"/>
+          <p:cNvPr id="2" name="Title 1"/>
+          <p:cNvSpPr>
+            <a:spLocks noGrp="1"/>
+          </p:cNvSpPr>
+          <p:nvPr>
+            <p:ph type="title"/>
           </p:nvPr>
         </p:nvSpPr>
         <p:spPr/>
@@ -10485,7 +7756,7 @@
           <a:p>
             <a:r>
               <a:rPr lang="en-US" dirty="0" smtClean="0"/>
-              <a:t>Now how do we make the calculator do something?</a:t>
+              <a:t>SwingSet3</a:t>
             </a:r>
             <a:endParaRPr lang="en-US" dirty="0"/>
           </a:p>
@@ -10493,31 +7764,134 @@
       </p:sp>
       <p:sp>
         <p:nvSpPr>
-          <p:cNvPr id="3" name="Title 2"/>
-          <p:cNvSpPr>
-            <a:spLocks noGrp="1"/>
-          </p:cNvSpPr>
-          <p:nvPr>
-            <p:ph type="title"/>
+          <p:cNvPr id="3" name="Content Placeholder 2"/>
+          <p:cNvSpPr>
+            <a:spLocks noGrp="1"/>
+          </p:cNvSpPr>
+          <p:nvPr>
+            <p:ph idx="1"/>
           </p:nvPr>
         </p:nvSpPr>
         <p:spPr/>
         <p:txBody>
-          <a:bodyPr/>
-          <a:lstStyle/>
-          <a:p>
+          <a:bodyPr>
+            <a:normAutofit lnSpcReduction="10000"/>
+          </a:bodyPr>
+          <a:lstStyle/>
+          <a:p>
+            <a:pPr marL="0" indent="0">
+              <a:buNone/>
+            </a:pPr>
             <a:r>
               <a:rPr lang="en-US" dirty="0" smtClean="0"/>
-              <a:t>Window Events</a:t>
-            </a:r>
-            <a:endParaRPr lang="en-US" dirty="0"/>
+              <a:t>The new version is available here:</a:t>
+            </a:r>
+          </a:p>
+          <a:p>
+            <a:pPr marL="0" indent="0">
+              <a:buNone/>
+            </a:pPr>
+            <a:r>
+              <a:rPr lang="en-US" sz="2400" dirty="0">
+                <a:hlinkClick r:id="rId2"/>
+              </a:rPr>
+              <a:t>http://</a:t>
+            </a:r>
+            <a:r>
+              <a:rPr lang="en-US" sz="2400" dirty="0" smtClean="0">
+                <a:hlinkClick r:id="rId2"/>
+              </a:rPr>
+              <a:t>download.java.net/javadesktop/swingset3</a:t>
+            </a:r>
+            <a:endParaRPr lang="en-US" sz="2400" dirty="0" smtClean="0"/>
+          </a:p>
+          <a:p>
+            <a:pPr marL="0" indent="0">
+              <a:buNone/>
+            </a:pPr>
+            <a:r>
+              <a:rPr lang="en-US" dirty="0" smtClean="0"/>
+              <a:t>but I honestly couldn’t make this one work.</a:t>
+            </a:r>
+          </a:p>
+          <a:p>
+            <a:pPr marL="0" indent="0">
+              <a:buNone/>
+            </a:pPr>
+            <a:endParaRPr lang="en-US" dirty="0" smtClean="0"/>
+          </a:p>
+          <a:p>
+            <a:pPr marL="0" indent="0">
+              <a:buNone/>
+            </a:pPr>
+            <a:r>
+              <a:rPr lang="en-US" dirty="0" smtClean="0"/>
+              <a:t>Instead, you should download </a:t>
+            </a:r>
+            <a:r>
+              <a:rPr lang="en-US" dirty="0" err="1" smtClean="0"/>
+              <a:t>laffy</a:t>
+            </a:r>
+            <a:r>
+              <a:rPr lang="en-US" dirty="0" smtClean="0"/>
+              <a:t>:</a:t>
+            </a:r>
+          </a:p>
+          <a:p>
+            <a:pPr marL="0" indent="0">
+              <a:buNone/>
+            </a:pPr>
+            <a:r>
+              <a:rPr lang="en-US" sz="2400" dirty="0">
+                <a:hlinkClick r:id="rId3"/>
+              </a:rPr>
+              <a:t>http://</a:t>
+            </a:r>
+            <a:r>
+              <a:rPr lang="en-US" sz="2400" dirty="0" smtClean="0">
+                <a:hlinkClick r:id="rId3"/>
+              </a:rPr>
+              <a:t>download.java.net/javadesktop/laffy/Laffy.jar</a:t>
+            </a:r>
+            <a:endParaRPr lang="en-US" sz="2400" dirty="0" smtClean="0"/>
+          </a:p>
+          <a:p>
+            <a:pPr marL="0" indent="0">
+              <a:buNone/>
+            </a:pPr>
+            <a:endParaRPr lang="en-US" sz="2400" dirty="0" smtClean="0"/>
+          </a:p>
+          <a:p>
+            <a:pPr marL="0" indent="0">
+              <a:buNone/>
+            </a:pPr>
+            <a:r>
+              <a:rPr lang="en-US" sz="2400" dirty="0" smtClean="0"/>
+              <a:t>Run:</a:t>
+            </a:r>
+          </a:p>
+          <a:p>
+            <a:pPr marL="0" indent="0">
+              <a:buNone/>
+            </a:pPr>
+            <a:r>
+              <a:rPr lang="en-US" sz="2400" dirty="0" smtClean="0">
+                <a:latin typeface="Consolas" panose="020B0609020204030204" pitchFamily="49" charset="0"/>
+                <a:cs typeface="Consolas" panose="020B0609020204030204" pitchFamily="49" charset="0"/>
+              </a:rPr>
+              <a:t>C:\Users\Student\Downloads&gt;java -jar laffy.jar</a:t>
+            </a:r>
+            <a:endParaRPr lang="en-US" sz="2400" dirty="0">
+              <a:latin typeface="Consolas" panose="020B0609020204030204" pitchFamily="49" charset="0"/>
+              <a:cs typeface="Consolas" panose="020B0609020204030204" pitchFamily="49" charset="0"/>
+            </a:endParaRPr>
           </a:p>
         </p:txBody>
       </p:sp>
     </p:spTree>
     <p:extLst>
       <p:ext uri="{BB962C8B-B14F-4D97-AF65-F5344CB8AC3E}">
-        <p14:creationId xmlns:p14="http://schemas.microsoft.com/office/powerpoint/2010/main" val="3781473554"/>
+        <p14:creationId xmlns:p14="http://schemas.microsoft.com/office/powerpoint/2010/main" val="826910313"/>
       </p:ext>
     </p:extLst>
   </p:cSld>
@@ -10568,80 +7942,70 @@
           <a:p>
             <a:r>
               <a:rPr lang="en-US" dirty="0" err="1" smtClean="0"/>
-              <a:t>CalculatorEngine</a:t>
+              <a:t>Laffy</a:t>
             </a:r>
             <a:endParaRPr lang="en-US" dirty="0"/>
           </a:p>
         </p:txBody>
       </p:sp>
-      <p:sp>
-        <p:nvSpPr>
-          <p:cNvPr id="3" name="Content Placeholder 2"/>
-          <p:cNvSpPr>
-            <a:spLocks noGrp="1"/>
-          </p:cNvSpPr>
-          <p:nvPr>
-            <p:ph idx="1"/>
-          </p:nvPr>
-        </p:nvSpPr>
-        <p:spPr/>
-        <p:txBody>
-          <a:bodyPr/>
-          <a:lstStyle/>
-          <a:p>
-            <a:r>
-              <a:rPr lang="en-US" dirty="0" smtClean="0"/>
-              <a:t>Class that implements </a:t>
-            </a:r>
-            <a:r>
-              <a:rPr lang="en-US" dirty="0" err="1" smtClean="0"/>
-              <a:t>ActionListener</a:t>
-            </a:r>
-            <a:endParaRPr lang="en-US" dirty="0" smtClean="0"/>
-          </a:p>
-          <a:p>
-            <a:r>
-              <a:rPr lang="en-US" dirty="0" smtClean="0"/>
-              <a:t>We will add this </a:t>
-            </a:r>
-            <a:r>
-              <a:rPr lang="en-US" dirty="0" err="1" smtClean="0"/>
-              <a:t>ActionListener</a:t>
-            </a:r>
-            <a:r>
-              <a:rPr lang="en-US" dirty="0" smtClean="0"/>
-              <a:t> implementation to each button with ‘</a:t>
-            </a:r>
-            <a:r>
-              <a:rPr lang="en-US" dirty="0" err="1" smtClean="0"/>
-              <a:t>addActionListener</a:t>
-            </a:r>
-            <a:r>
-              <a:rPr lang="en-US" dirty="0" smtClean="0"/>
-              <a:t>’ method.</a:t>
-            </a:r>
-          </a:p>
-          <a:p>
-            <a:r>
-              <a:rPr lang="en-US" dirty="0" smtClean="0"/>
-              <a:t>In the book the whole implementation is in this method. We will instead call ‘</a:t>
-            </a:r>
-            <a:r>
-              <a:rPr lang="en-US" dirty="0" err="1" smtClean="0"/>
-              <a:t>keyInput</a:t>
-            </a:r>
-            <a:r>
-              <a:rPr lang="en-US" dirty="0" smtClean="0"/>
-              <a:t>’ on a presenter object.</a:t>
-            </a:r>
-            <a:endParaRPr lang="en-US" dirty="0"/>
-          </a:p>
-        </p:txBody>
-      </p:sp>
+      <p:pic>
+        <p:nvPicPr>
+          <p:cNvPr id="2050" name="Picture 2"/>
+          <p:cNvPicPr>
+            <a:picLocks noChangeAspect="1" noChangeArrowheads="1"/>
+          </p:cNvPicPr>
+          <p:nvPr/>
+        </p:nvPicPr>
+        <p:blipFill>
+          <a:blip r:embed="rId2">
+            <a:extLst>
+              <a:ext uri="{28A0092B-C50C-407E-A947-70E740481C1C}">
+                <a14:useLocalDpi xmlns:a14="http://schemas.microsoft.com/office/drawing/2010/main" val="0"/>
+              </a:ext>
+            </a:extLst>
+          </a:blip>
+          <a:srcRect/>
+          <a:stretch>
+            <a:fillRect/>
+          </a:stretch>
+        </p:blipFill>
+        <p:spPr bwMode="auto">
+          <a:xfrm>
+            <a:off x="457200" y="1600200"/>
+            <a:ext cx="8448675" cy="5057365"/>
+          </a:xfrm>
+          <a:prstGeom prst="rect">
+            <a:avLst/>
+          </a:prstGeom>
+          <a:noFill/>
+          <a:ln>
+            <a:noFill/>
+          </a:ln>
+          <a:extLst>
+            <a:ext uri="{909E8E84-426E-40DD-AFC4-6F175D3DCCD1}">
+              <a14:hiddenFill xmlns:a14="http://schemas.microsoft.com/office/drawing/2010/main">
+                <a:solidFill>
+                  <a:schemeClr val="accent1"/>
+                </a:solidFill>
+              </a14:hiddenFill>
+            </a:ext>
+            <a:ext uri="{91240B29-F687-4F45-9708-019B960494DF}">
+              <a14:hiddenLine xmlns:a14="http://schemas.microsoft.com/office/drawing/2010/main" w="9525">
+                <a:solidFill>
+                  <a:schemeClr val="tx1"/>
+                </a:solidFill>
+                <a:miter lim="800000"/>
+                <a:headEnd/>
+                <a:tailEnd/>
+              </a14:hiddenLine>
+            </a:ext>
+          </a:extLst>
+        </p:spPr>
+      </p:pic>
     </p:spTree>
     <p:extLst>
       <p:ext uri="{BB962C8B-B14F-4D97-AF65-F5344CB8AC3E}">
-        <p14:creationId xmlns:p14="http://schemas.microsoft.com/office/powerpoint/2010/main" val="2395120618"/>
+        <p14:creationId xmlns:p14="http://schemas.microsoft.com/office/powerpoint/2010/main" val="1556896223"/>
       </p:ext>
     </p:extLst>
   </p:cSld>
@@ -10691,42 +8055,120 @@
           <a:lstStyle/>
           <a:p>
             <a:r>
+              <a:rPr lang="en-US" dirty="0" err="1" smtClean="0"/>
+              <a:t>Laffy</a:t>
+            </a:r>
+            <a:endParaRPr lang="en-US" dirty="0"/>
+          </a:p>
+        </p:txBody>
+      </p:sp>
+      <p:sp>
+        <p:nvSpPr>
+          <p:cNvPr id="3" name="Content Placeholder 2"/>
+          <p:cNvSpPr>
+            <a:spLocks noGrp="1"/>
+          </p:cNvSpPr>
+          <p:nvPr>
+            <p:ph idx="1"/>
+          </p:nvPr>
+        </p:nvSpPr>
+        <p:spPr/>
+        <p:txBody>
+          <a:bodyPr/>
+          <a:lstStyle/>
+          <a:p>
+            <a:pPr marL="0" indent="0">
+              <a:buNone/>
+            </a:pPr>
+            <a:r>
               <a:rPr lang="en-US" dirty="0" smtClean="0"/>
-              <a:t>Calculator</a:t>
-            </a:r>
+              <a:t>Source code and other resources are available here:</a:t>
+            </a:r>
+          </a:p>
+          <a:p>
+            <a:pPr marL="0" indent="0">
+              <a:buNone/>
+            </a:pPr>
+            <a:r>
+              <a:rPr lang="en-US" sz="2400" dirty="0">
+                <a:hlinkClick r:id="rId2"/>
+              </a:rPr>
+              <a:t>https://</a:t>
+            </a:r>
+            <a:r>
+              <a:rPr lang="en-US" sz="2400" dirty="0" smtClean="0">
+                <a:hlinkClick r:id="rId2"/>
+              </a:rPr>
+              <a:t>java.net/projects/laffy</a:t>
+            </a:r>
+            <a:endParaRPr lang="en-US" sz="2400" dirty="0" smtClean="0"/>
+          </a:p>
+          <a:p>
+            <a:pPr marL="0" indent="0">
+              <a:buNone/>
+            </a:pPr>
             <a:endParaRPr lang="en-US" dirty="0"/>
           </a:p>
         </p:txBody>
       </p:sp>
-      <p:sp>
-        <p:nvSpPr>
-          <p:cNvPr id="3" name="Content Placeholder 2"/>
-          <p:cNvSpPr>
-            <a:spLocks noGrp="1"/>
-          </p:cNvSpPr>
-          <p:nvPr>
-            <p:ph idx="1"/>
-          </p:nvPr>
-        </p:nvSpPr>
-        <p:spPr/>
-        <p:txBody>
-          <a:bodyPr/>
-          <a:lstStyle/>
-          <a:p>
-            <a:r>
-              <a:rPr lang="en-US" dirty="0" smtClean="0"/>
-              <a:t>Let’s look at the book’s Chapter 6. Window Events.</a:t>
-            </a:r>
-          </a:p>
-          <a:p>
-            <a:endParaRPr lang="en-US" dirty="0"/>
-          </a:p>
-        </p:txBody>
-      </p:sp>
+      <p:pic>
+        <p:nvPicPr>
+          <p:cNvPr id="3074" name="Picture 2"/>
+          <p:cNvPicPr>
+            <a:picLocks noChangeAspect="1" noChangeArrowheads="1"/>
+          </p:cNvPicPr>
+          <p:nvPr/>
+        </p:nvPicPr>
+        <p:blipFill>
+          <a:blip r:embed="rId3">
+            <a:extLst>
+              <a:ext uri="{28A0092B-C50C-407E-A947-70E740481C1C}">
+                <a14:useLocalDpi xmlns:a14="http://schemas.microsoft.com/office/drawing/2010/main" val="0"/>
+              </a:ext>
+            </a:extLst>
+          </a:blip>
+          <a:srcRect/>
+          <a:stretch>
+            <a:fillRect/>
+          </a:stretch>
+        </p:blipFill>
+        <p:spPr bwMode="auto">
+          <a:xfrm>
+            <a:off x="1676400" y="3581400"/>
+            <a:ext cx="6334125" cy="2495550"/>
+          </a:xfrm>
+          <a:prstGeom prst="rect">
+            <a:avLst/>
+          </a:prstGeom>
+          <a:noFill/>
+          <a:ln>
+            <a:noFill/>
+          </a:ln>
+          <a:extLst>
+            <a:ext uri="{909E8E84-426E-40DD-AFC4-6F175D3DCCD1}">
+              <a14:hiddenFill xmlns:a14="http://schemas.microsoft.com/office/drawing/2010/main">
+                <a:solidFill>
+                  <a:schemeClr val="accent1"/>
+                </a:solidFill>
+              </a14:hiddenFill>
+            </a:ext>
+            <a:ext uri="{91240B29-F687-4F45-9708-019B960494DF}">
+              <a14:hiddenLine xmlns:a14="http://schemas.microsoft.com/office/drawing/2010/main" w="9525">
+                <a:solidFill>
+                  <a:schemeClr val="tx1"/>
+                </a:solidFill>
+                <a:miter lim="800000"/>
+                <a:headEnd/>
+                <a:tailEnd/>
+              </a14:hiddenLine>
+            </a:ext>
+          </a:extLst>
+        </p:spPr>
+      </p:pic>
     </p:spTree>
     <p:extLst>
       <p:ext uri="{BB962C8B-B14F-4D97-AF65-F5344CB8AC3E}">
-        <p14:creationId xmlns:p14="http://schemas.microsoft.com/office/powerpoint/2010/main" val="2069323497"/>
+        <p14:creationId xmlns:p14="http://schemas.microsoft.com/office/powerpoint/2010/main" val="2847936446"/>
       </p:ext>
     </p:extLst>
   </p:cSld>
@@ -10762,6 +8204,298 @@
       </p:grpSpPr>
       <p:sp>
         <p:nvSpPr>
+          <p:cNvPr id="2" name="Subtitle 1"/>
+          <p:cNvSpPr>
+            <a:spLocks noGrp="1"/>
+          </p:cNvSpPr>
+          <p:nvPr>
+            <p:ph type="subTitle" idx="1"/>
+          </p:nvPr>
+        </p:nvSpPr>
+        <p:spPr/>
+        <p:txBody>
+          <a:bodyPr/>
+          <a:lstStyle/>
+          <a:p>
+            <a:r>
+              <a:rPr lang="en-US" dirty="0" smtClean="0"/>
+              <a:t>Now how do we make the calculator do something?</a:t>
+            </a:r>
+            <a:endParaRPr lang="en-US" dirty="0"/>
+          </a:p>
+        </p:txBody>
+      </p:sp>
+      <p:sp>
+        <p:nvSpPr>
+          <p:cNvPr id="3" name="Title 2"/>
+          <p:cNvSpPr>
+            <a:spLocks noGrp="1"/>
+          </p:cNvSpPr>
+          <p:nvPr>
+            <p:ph type="title"/>
+          </p:nvPr>
+        </p:nvSpPr>
+        <p:spPr/>
+        <p:txBody>
+          <a:bodyPr/>
+          <a:lstStyle/>
+          <a:p>
+            <a:r>
+              <a:rPr lang="en-US" dirty="0" smtClean="0"/>
+              <a:t>Window Events</a:t>
+            </a:r>
+            <a:endParaRPr lang="en-US" dirty="0"/>
+          </a:p>
+        </p:txBody>
+      </p:sp>
+    </p:spTree>
+    <p:extLst>
+      <p:ext uri="{BB962C8B-B14F-4D97-AF65-F5344CB8AC3E}">
+        <p14:creationId xmlns:p14="http://schemas.microsoft.com/office/powerpoint/2010/main" val="3781473554"/>
+      </p:ext>
+    </p:extLst>
+  </p:cSld>
+  <p:clrMapOvr>
+    <a:masterClrMapping/>
+  </p:clrMapOvr>
+  <p:timing>
+    <p:tnLst>
+      <p:par>
+        <p:cTn id="1" dur="indefinite" restart="never" nodeType="tmRoot"/>
+      </p:par>
+    </p:tnLst>
+  </p:timing>
+</p:sld>
+</file>
+
+<file path=ppt/slides/slide27.xml><?xml version="1.0" encoding="utf-8"?>
+<p:sld xmlns:a="http://schemas.openxmlformats.org/drawingml/2006/main" xmlns:r="http://schemas.openxmlformats.org/officeDocument/2006/relationships" xmlns:p="http://schemas.openxmlformats.org/presentationml/2006/main">
+  <p:cSld>
+    <p:spTree>
+      <p:nvGrpSpPr>
+        <p:cNvPr id="1" name=""/>
+        <p:cNvGrpSpPr/>
+        <p:nvPr/>
+      </p:nvGrpSpPr>
+      <p:grpSpPr>
+        <a:xfrm>
+          <a:off x="0" y="0"/>
+          <a:ext cx="0" cy="0"/>
+          <a:chOff x="0" y="0"/>
+          <a:chExt cx="0" cy="0"/>
+        </a:xfrm>
+      </p:grpSpPr>
+      <p:sp>
+        <p:nvSpPr>
+          <p:cNvPr id="2" name="Title 1"/>
+          <p:cNvSpPr>
+            <a:spLocks noGrp="1"/>
+          </p:cNvSpPr>
+          <p:nvPr>
+            <p:ph type="title"/>
+          </p:nvPr>
+        </p:nvSpPr>
+        <p:spPr/>
+        <p:txBody>
+          <a:bodyPr/>
+          <a:lstStyle/>
+          <a:p>
+            <a:r>
+              <a:rPr lang="en-US" dirty="0" err="1" smtClean="0"/>
+              <a:t>CalculatorEngine</a:t>
+            </a:r>
+            <a:endParaRPr lang="en-US" dirty="0"/>
+          </a:p>
+        </p:txBody>
+      </p:sp>
+      <p:sp>
+        <p:nvSpPr>
+          <p:cNvPr id="3" name="Content Placeholder 2"/>
+          <p:cNvSpPr>
+            <a:spLocks noGrp="1"/>
+          </p:cNvSpPr>
+          <p:nvPr>
+            <p:ph idx="1"/>
+          </p:nvPr>
+        </p:nvSpPr>
+        <p:spPr/>
+        <p:txBody>
+          <a:bodyPr/>
+          <a:lstStyle/>
+          <a:p>
+            <a:r>
+              <a:rPr lang="en-US" dirty="0" smtClean="0"/>
+              <a:t>Class that implements </a:t>
+            </a:r>
+            <a:r>
+              <a:rPr lang="en-US" dirty="0" err="1" smtClean="0"/>
+              <a:t>ActionListener</a:t>
+            </a:r>
+            <a:endParaRPr lang="en-US" dirty="0" smtClean="0"/>
+          </a:p>
+          <a:p>
+            <a:r>
+              <a:rPr lang="en-US" dirty="0" smtClean="0"/>
+              <a:t>We will add this </a:t>
+            </a:r>
+            <a:r>
+              <a:rPr lang="en-US" dirty="0" err="1" smtClean="0"/>
+              <a:t>ActionListener</a:t>
+            </a:r>
+            <a:r>
+              <a:rPr lang="en-US" dirty="0" smtClean="0"/>
+              <a:t> implementation to each button with ‘</a:t>
+            </a:r>
+            <a:r>
+              <a:rPr lang="en-US" dirty="0" err="1" smtClean="0"/>
+              <a:t>addActionListener</a:t>
+            </a:r>
+            <a:r>
+              <a:rPr lang="en-US" dirty="0" smtClean="0"/>
+              <a:t>’ method.</a:t>
+            </a:r>
+          </a:p>
+          <a:p>
+            <a:r>
+              <a:rPr lang="en-US" dirty="0" smtClean="0"/>
+              <a:t>In the book the whole implementation is in this method. We will instead call ‘</a:t>
+            </a:r>
+            <a:r>
+              <a:rPr lang="en-US" dirty="0" err="1" smtClean="0"/>
+              <a:t>keyInput</a:t>
+            </a:r>
+            <a:r>
+              <a:rPr lang="en-US" dirty="0" smtClean="0"/>
+              <a:t>’ on a presenter object.</a:t>
+            </a:r>
+            <a:endParaRPr lang="en-US" dirty="0"/>
+          </a:p>
+        </p:txBody>
+      </p:sp>
+    </p:spTree>
+    <p:extLst>
+      <p:ext uri="{BB962C8B-B14F-4D97-AF65-F5344CB8AC3E}">
+        <p14:creationId xmlns:p14="http://schemas.microsoft.com/office/powerpoint/2010/main" val="2395120618"/>
+      </p:ext>
+    </p:extLst>
+  </p:cSld>
+  <p:clrMapOvr>
+    <a:masterClrMapping/>
+  </p:clrMapOvr>
+  <p:timing>
+    <p:tnLst>
+      <p:par>
+        <p:cTn id="1" dur="indefinite" restart="never" nodeType="tmRoot"/>
+      </p:par>
+    </p:tnLst>
+  </p:timing>
+</p:sld>
+</file>
+
+<file path=ppt/slides/slide28.xml><?xml version="1.0" encoding="utf-8"?>
+<p:sld xmlns:a="http://schemas.openxmlformats.org/drawingml/2006/main" xmlns:r="http://schemas.openxmlformats.org/officeDocument/2006/relationships" xmlns:p="http://schemas.openxmlformats.org/presentationml/2006/main">
+  <p:cSld>
+    <p:spTree>
+      <p:nvGrpSpPr>
+        <p:cNvPr id="1" name=""/>
+        <p:cNvGrpSpPr/>
+        <p:nvPr/>
+      </p:nvGrpSpPr>
+      <p:grpSpPr>
+        <a:xfrm>
+          <a:off x="0" y="0"/>
+          <a:ext cx="0" cy="0"/>
+          <a:chOff x="0" y="0"/>
+          <a:chExt cx="0" cy="0"/>
+        </a:xfrm>
+      </p:grpSpPr>
+      <p:sp>
+        <p:nvSpPr>
+          <p:cNvPr id="2" name="Title 1"/>
+          <p:cNvSpPr>
+            <a:spLocks noGrp="1"/>
+          </p:cNvSpPr>
+          <p:nvPr>
+            <p:ph type="title"/>
+          </p:nvPr>
+        </p:nvSpPr>
+        <p:spPr/>
+        <p:txBody>
+          <a:bodyPr/>
+          <a:lstStyle/>
+          <a:p>
+            <a:r>
+              <a:rPr lang="en-US" dirty="0" smtClean="0"/>
+              <a:t>Calculator</a:t>
+            </a:r>
+            <a:endParaRPr lang="en-US" dirty="0"/>
+          </a:p>
+        </p:txBody>
+      </p:sp>
+      <p:sp>
+        <p:nvSpPr>
+          <p:cNvPr id="3" name="Content Placeholder 2"/>
+          <p:cNvSpPr>
+            <a:spLocks noGrp="1"/>
+          </p:cNvSpPr>
+          <p:nvPr>
+            <p:ph idx="1"/>
+          </p:nvPr>
+        </p:nvSpPr>
+        <p:spPr/>
+        <p:txBody>
+          <a:bodyPr/>
+          <a:lstStyle/>
+          <a:p>
+            <a:r>
+              <a:rPr lang="en-US" dirty="0" smtClean="0"/>
+              <a:t>Let’s look at the book’s Chapter 6. Window Events.</a:t>
+            </a:r>
+          </a:p>
+          <a:p>
+            <a:endParaRPr lang="en-US" dirty="0"/>
+          </a:p>
+        </p:txBody>
+      </p:sp>
+    </p:spTree>
+    <p:extLst>
+      <p:ext uri="{BB962C8B-B14F-4D97-AF65-F5344CB8AC3E}">
+        <p14:creationId xmlns:p14="http://schemas.microsoft.com/office/powerpoint/2010/main" val="2069323497"/>
+      </p:ext>
+    </p:extLst>
+  </p:cSld>
+  <p:clrMapOvr>
+    <a:masterClrMapping/>
+  </p:clrMapOvr>
+  <p:timing>
+    <p:tnLst>
+      <p:par>
+        <p:cTn id="1" dur="indefinite" restart="never" nodeType="tmRoot"/>
+      </p:par>
+    </p:tnLst>
+  </p:timing>
+</p:sld>
+</file>
+
+<file path=ppt/slides/slide29.xml><?xml version="1.0" encoding="utf-8"?>
+<p:sld xmlns:a="http://schemas.openxmlformats.org/drawingml/2006/main" xmlns:r="http://schemas.openxmlformats.org/officeDocument/2006/relationships" xmlns:p="http://schemas.openxmlformats.org/presentationml/2006/main">
+  <p:cSld>
+    <p:spTree>
+      <p:nvGrpSpPr>
+        <p:cNvPr id="1" name=""/>
+        <p:cNvGrpSpPr/>
+        <p:nvPr/>
+      </p:nvGrpSpPr>
+      <p:grpSpPr>
+        <a:xfrm>
+          <a:off x="0" y="0"/>
+          <a:ext cx="0" cy="0"/>
+          <a:chOff x="0" y="0"/>
+          <a:chExt cx="0" cy="0"/>
+        </a:xfrm>
+      </p:grpSpPr>
+      <p:sp>
+        <p:nvSpPr>
           <p:cNvPr id="2" name="Title 1"/>
           <p:cNvSpPr>
             <a:spLocks noGrp="1"/>
@@ -10857,7 +8591,179 @@
 </p:sld>
 </file>
 
-<file path=ppt/slides/slide27.xml><?xml version="1.0" encoding="utf-8"?>
+<file path=ppt/slides/slide3.xml><?xml version="1.0" encoding="utf-8"?>
+<p:sld xmlns:a="http://schemas.openxmlformats.org/drawingml/2006/main" xmlns:r="http://schemas.openxmlformats.org/officeDocument/2006/relationships" xmlns:p="http://schemas.openxmlformats.org/presentationml/2006/main">
+  <p:cSld>
+    <p:spTree>
+      <p:nvGrpSpPr>
+        <p:cNvPr id="1" name=""/>
+        <p:cNvGrpSpPr/>
+        <p:nvPr/>
+      </p:nvGrpSpPr>
+      <p:grpSpPr>
+        <a:xfrm>
+          <a:off x="0" y="0"/>
+          <a:ext cx="0" cy="0"/>
+          <a:chOff x="0" y="0"/>
+          <a:chExt cx="0" cy="0"/>
+        </a:xfrm>
+      </p:grpSpPr>
+      <p:sp>
+        <p:nvSpPr>
+          <p:cNvPr id="2" name="Title 1"/>
+          <p:cNvSpPr>
+            <a:spLocks noGrp="1"/>
+          </p:cNvSpPr>
+          <p:nvPr>
+            <p:ph type="title"/>
+          </p:nvPr>
+        </p:nvSpPr>
+        <p:spPr/>
+        <p:txBody>
+          <a:bodyPr/>
+          <a:lstStyle/>
+          <a:p>
+            <a:r>
+              <a:rPr lang="en-US" dirty="0" smtClean="0"/>
+              <a:t>Swing Application</a:t>
+            </a:r>
+            <a:endParaRPr lang="en-US" dirty="0"/>
+          </a:p>
+        </p:txBody>
+      </p:sp>
+      <p:sp>
+        <p:nvSpPr>
+          <p:cNvPr id="3" name="Content Placeholder 2"/>
+          <p:cNvSpPr>
+            <a:spLocks noGrp="1"/>
+          </p:cNvSpPr>
+          <p:nvPr>
+            <p:ph idx="1"/>
+          </p:nvPr>
+        </p:nvSpPr>
+        <p:spPr/>
+        <p:txBody>
+          <a:bodyPr>
+            <a:normAutofit/>
+          </a:bodyPr>
+          <a:lstStyle/>
+          <a:p>
+            <a:r>
+              <a:rPr lang="en-US" dirty="0" smtClean="0"/>
+              <a:t>Create a </a:t>
+            </a:r>
+            <a:r>
+              <a:rPr lang="en-US" dirty="0" err="1" smtClean="0"/>
+              <a:t>JPanel</a:t>
+            </a:r>
+            <a:endParaRPr lang="en-US" dirty="0" smtClean="0"/>
+          </a:p>
+          <a:p>
+            <a:r>
+              <a:rPr lang="en-US" dirty="0" smtClean="0"/>
+              <a:t>Assign a layout manager to the </a:t>
+            </a:r>
+            <a:r>
+              <a:rPr lang="en-US" dirty="0" err="1"/>
+              <a:t>JPanel</a:t>
+            </a:r>
+            <a:endParaRPr lang="en-US" dirty="0" smtClean="0"/>
+          </a:p>
+          <a:p>
+            <a:r>
+              <a:rPr lang="en-US" dirty="0" smtClean="0"/>
+              <a:t>Add windows controls to the </a:t>
+            </a:r>
+            <a:r>
+              <a:rPr lang="en-US" dirty="0" err="1" smtClean="0"/>
+              <a:t>Jpanel</a:t>
+            </a:r>
+            <a:endParaRPr lang="en-US" dirty="0" smtClean="0"/>
+          </a:p>
+          <a:p>
+            <a:r>
+              <a:rPr lang="en-US" dirty="0"/>
+              <a:t>Create a </a:t>
+            </a:r>
+            <a:r>
+              <a:rPr lang="en-US" dirty="0" err="1" smtClean="0"/>
+              <a:t>JFrame</a:t>
+            </a:r>
+            <a:endParaRPr lang="en-US" dirty="0" smtClean="0"/>
+          </a:p>
+          <a:p>
+            <a:r>
+              <a:rPr lang="en-US" dirty="0" smtClean="0"/>
+              <a:t>Add the </a:t>
+            </a:r>
+            <a:r>
+              <a:rPr lang="en-US" dirty="0" err="1"/>
+              <a:t>JPanel</a:t>
+            </a:r>
+            <a:r>
+              <a:rPr lang="en-US" dirty="0" smtClean="0"/>
+              <a:t> to the </a:t>
+            </a:r>
+            <a:r>
+              <a:rPr lang="en-US" dirty="0" err="1" smtClean="0"/>
+              <a:t>Jframe</a:t>
+            </a:r>
+            <a:endParaRPr lang="en-US" dirty="0" smtClean="0"/>
+          </a:p>
+          <a:p>
+            <a:r>
+              <a:rPr lang="en-US" dirty="0" smtClean="0"/>
+              <a:t>Set </a:t>
+            </a:r>
+            <a:r>
+              <a:rPr lang="en-US" dirty="0" err="1" smtClean="0"/>
+              <a:t>JFrame</a:t>
+            </a:r>
+            <a:r>
+              <a:rPr lang="en-US" dirty="0" smtClean="0"/>
+              <a:t> size</a:t>
+            </a:r>
+          </a:p>
+          <a:p>
+            <a:r>
+              <a:rPr lang="en-US" dirty="0" smtClean="0"/>
+              <a:t>Set </a:t>
+            </a:r>
+            <a:r>
+              <a:rPr lang="en-US" dirty="0" err="1" smtClean="0"/>
+              <a:t>JFrame</a:t>
+            </a:r>
+            <a:r>
+              <a:rPr lang="en-US" dirty="0" smtClean="0"/>
+              <a:t> visible</a:t>
+            </a:r>
+          </a:p>
+          <a:p>
+            <a:endParaRPr lang="en-US" dirty="0"/>
+          </a:p>
+        </p:txBody>
+      </p:sp>
+    </p:spTree>
+    <p:extLst>
+      <p:ext uri="{BB962C8B-B14F-4D97-AF65-F5344CB8AC3E}">
+        <p14:creationId xmlns:p14="http://schemas.microsoft.com/office/powerpoint/2010/main" val="3085795561"/>
+      </p:ext>
+    </p:extLst>
+  </p:cSld>
+  <p:clrMapOvr>
+    <a:masterClrMapping/>
+  </p:clrMapOvr>
+  <p:timing>
+    <p:tnLst>
+      <p:par>
+        <p:cTn id="1" dur="indefinite" restart="never" nodeType="tmRoot"/>
+      </p:par>
+    </p:tnLst>
+  </p:timing>
+</p:sld>
+</file>
+
+<file path=ppt/slides/slide30.xml><?xml version="1.0" encoding="utf-8"?>
 <p:sld xmlns:a="http://schemas.openxmlformats.org/drawingml/2006/main" xmlns:r="http://schemas.openxmlformats.org/officeDocument/2006/relationships" xmlns:p="http://schemas.openxmlformats.org/presentationml/2006/main">
   <p:cSld>
     <p:spTree>
@@ -11715,7 +9621,7 @@
 </p:sld>
 </file>
 
-<file path=ppt/slides/slide28.xml><?xml version="1.0" encoding="utf-8"?>
+<file path=ppt/slides/slide31.xml><?xml version="1.0" encoding="utf-8"?>
 <p:sld xmlns:a="http://schemas.openxmlformats.org/drawingml/2006/main" xmlns:r="http://schemas.openxmlformats.org/officeDocument/2006/relationships" xmlns:p="http://schemas.openxmlformats.org/presentationml/2006/main">
   <p:cSld>
     <p:spTree>
@@ -11883,7 +9789,7 @@
 </p:sld>
 </file>
 
-<file path=ppt/slides/slide29.xml><?xml version="1.0" encoding="utf-8"?>
+<file path=ppt/slides/slide32.xml><?xml version="1.0" encoding="utf-8"?>
 <p:sld xmlns:a="http://schemas.openxmlformats.org/drawingml/2006/main" xmlns:r="http://schemas.openxmlformats.org/officeDocument/2006/relationships" xmlns:p="http://schemas.openxmlformats.org/presentationml/2006/main">
   <p:cSld>
     <p:spTree>
@@ -11997,179 +9903,7 @@
 </p:sld>
 </file>
 
-<file path=ppt/slides/slide3.xml><?xml version="1.0" encoding="utf-8"?>
-<p:sld xmlns:a="http://schemas.openxmlformats.org/drawingml/2006/main" xmlns:r="http://schemas.openxmlformats.org/officeDocument/2006/relationships" xmlns:p="http://schemas.openxmlformats.org/presentationml/2006/main">
-  <p:cSld>
-    <p:spTree>
-      <p:nvGrpSpPr>
-        <p:cNvPr id="1" name=""/>
-        <p:cNvGrpSpPr/>
-        <p:nvPr/>
-      </p:nvGrpSpPr>
-      <p:grpSpPr>
-        <a:xfrm>
-          <a:off x="0" y="0"/>
-          <a:ext cx="0" cy="0"/>
-          <a:chOff x="0" y="0"/>
-          <a:chExt cx="0" cy="0"/>
-        </a:xfrm>
-      </p:grpSpPr>
-      <p:sp>
-        <p:nvSpPr>
-          <p:cNvPr id="2" name="Title 1"/>
-          <p:cNvSpPr>
-            <a:spLocks noGrp="1"/>
-          </p:cNvSpPr>
-          <p:nvPr>
-            <p:ph type="title"/>
-          </p:nvPr>
-        </p:nvSpPr>
-        <p:spPr/>
-        <p:txBody>
-          <a:bodyPr/>
-          <a:lstStyle/>
-          <a:p>
-            <a:r>
-              <a:rPr lang="en-US" dirty="0" smtClean="0"/>
-              <a:t>Swing Application</a:t>
-            </a:r>
-            <a:endParaRPr lang="en-US" dirty="0"/>
-          </a:p>
-        </p:txBody>
-      </p:sp>
-      <p:sp>
-        <p:nvSpPr>
-          <p:cNvPr id="3" name="Content Placeholder 2"/>
-          <p:cNvSpPr>
-            <a:spLocks noGrp="1"/>
-          </p:cNvSpPr>
-          <p:nvPr>
-            <p:ph idx="1"/>
-          </p:nvPr>
-        </p:nvSpPr>
-        <p:spPr/>
-        <p:txBody>
-          <a:bodyPr>
-            <a:normAutofit/>
-          </a:bodyPr>
-          <a:lstStyle/>
-          <a:p>
-            <a:r>
-              <a:rPr lang="en-US" dirty="0" smtClean="0"/>
-              <a:t>Create a </a:t>
-            </a:r>
-            <a:r>
-              <a:rPr lang="en-US" dirty="0" err="1" smtClean="0"/>
-              <a:t>JPanel</a:t>
-            </a:r>
-            <a:endParaRPr lang="en-US" dirty="0" smtClean="0"/>
-          </a:p>
-          <a:p>
-            <a:r>
-              <a:rPr lang="en-US" dirty="0" smtClean="0"/>
-              <a:t>Assign a layout manager to the </a:t>
-            </a:r>
-            <a:r>
-              <a:rPr lang="en-US" dirty="0" err="1"/>
-              <a:t>JPanel</a:t>
-            </a:r>
-            <a:endParaRPr lang="en-US" dirty="0" smtClean="0"/>
-          </a:p>
-          <a:p>
-            <a:r>
-              <a:rPr lang="en-US" dirty="0" smtClean="0"/>
-              <a:t>Add windows controls to the </a:t>
-            </a:r>
-            <a:r>
-              <a:rPr lang="en-US" dirty="0" err="1" smtClean="0"/>
-              <a:t>Jpanel</a:t>
-            </a:r>
-            <a:endParaRPr lang="en-US" dirty="0" smtClean="0"/>
-          </a:p>
-          <a:p>
-            <a:r>
-              <a:rPr lang="en-US" dirty="0"/>
-              <a:t>Create a </a:t>
-            </a:r>
-            <a:r>
-              <a:rPr lang="en-US" dirty="0" err="1" smtClean="0"/>
-              <a:t>JFrame</a:t>
-            </a:r>
-            <a:endParaRPr lang="en-US" dirty="0" smtClean="0"/>
-          </a:p>
-          <a:p>
-            <a:r>
-              <a:rPr lang="en-US" dirty="0" smtClean="0"/>
-              <a:t>Add the </a:t>
-            </a:r>
-            <a:r>
-              <a:rPr lang="en-US" dirty="0" err="1"/>
-              <a:t>JPanel</a:t>
-            </a:r>
-            <a:r>
-              <a:rPr lang="en-US" dirty="0" smtClean="0"/>
-              <a:t> to the </a:t>
-            </a:r>
-            <a:r>
-              <a:rPr lang="en-US" dirty="0" err="1" smtClean="0"/>
-              <a:t>Jframe</a:t>
-            </a:r>
-            <a:endParaRPr lang="en-US" dirty="0" smtClean="0"/>
-          </a:p>
-          <a:p>
-            <a:r>
-              <a:rPr lang="en-US" dirty="0" smtClean="0"/>
-              <a:t>Set </a:t>
-            </a:r>
-            <a:r>
-              <a:rPr lang="en-US" dirty="0" err="1" smtClean="0"/>
-              <a:t>JFrame</a:t>
-            </a:r>
-            <a:r>
-              <a:rPr lang="en-US" dirty="0" smtClean="0"/>
-              <a:t> size</a:t>
-            </a:r>
-          </a:p>
-          <a:p>
-            <a:r>
-              <a:rPr lang="en-US" dirty="0" smtClean="0"/>
-              <a:t>Set </a:t>
-            </a:r>
-            <a:r>
-              <a:rPr lang="en-US" dirty="0" err="1" smtClean="0"/>
-              <a:t>JFrame</a:t>
-            </a:r>
-            <a:r>
-              <a:rPr lang="en-US" dirty="0" smtClean="0"/>
-              <a:t> visible</a:t>
-            </a:r>
-          </a:p>
-          <a:p>
-            <a:endParaRPr lang="en-US" dirty="0"/>
-          </a:p>
-        </p:txBody>
-      </p:sp>
-    </p:spTree>
-    <p:extLst>
-      <p:ext uri="{BB962C8B-B14F-4D97-AF65-F5344CB8AC3E}">
-        <p14:creationId xmlns:p14="http://schemas.microsoft.com/office/powerpoint/2010/main" val="3085795561"/>
-      </p:ext>
-    </p:extLst>
-  </p:cSld>
-  <p:clrMapOvr>
-    <a:masterClrMapping/>
-  </p:clrMapOvr>
-  <p:timing>
-    <p:tnLst>
-      <p:par>
-        <p:cTn id="1" dur="indefinite" restart="never" nodeType="tmRoot"/>
-      </p:par>
-    </p:tnLst>
-  </p:timing>
-</p:sld>
-</file>
-
-<file path=ppt/slides/slide30.xml><?xml version="1.0" encoding="utf-8"?>
+<file path=ppt/slides/slide33.xml><?xml version="1.0" encoding="utf-8"?>
 <p:sld xmlns:a="http://schemas.openxmlformats.org/drawingml/2006/main" xmlns:r="http://schemas.openxmlformats.org/officeDocument/2006/relationships" xmlns:p="http://schemas.openxmlformats.org/presentationml/2006/main">
   <p:cSld>
     <p:spTree>
@@ -12354,7 +10088,7 @@
 </p:sld>
 </file>
 
-<file path=ppt/slides/slide31.xml><?xml version="1.0" encoding="utf-8"?>
+<file path=ppt/slides/slide34.xml><?xml version="1.0" encoding="utf-8"?>
 <p:sld xmlns:a="http://schemas.openxmlformats.org/drawingml/2006/main" xmlns:r="http://schemas.openxmlformats.org/officeDocument/2006/relationships" xmlns:p="http://schemas.openxmlformats.org/presentationml/2006/main">
   <p:cSld>
     <p:spTree>
@@ -12518,7 +10252,7 @@
 </p:sld>
 </file>
 
-<file path=ppt/slides/slide32.xml><?xml version="1.0" encoding="utf-8"?>
+<file path=ppt/slides/slide35.xml><?xml version="1.0" encoding="utf-8"?>
 <p:sld xmlns:a="http://schemas.openxmlformats.org/drawingml/2006/main" xmlns:r="http://schemas.openxmlformats.org/officeDocument/2006/relationships" xmlns:p="http://schemas.openxmlformats.org/presentationml/2006/main">
   <p:cSld>
     <p:spTree>
@@ -12558,31 +10292,137 @@
           </a:p>
         </p:txBody>
       </p:sp>
-      <p:graphicFrame>
-        <p:nvGraphicFramePr>
-          <p:cNvPr id="4" name="Content Placeholder 3"/>
-          <p:cNvGraphicFramePr>
-            <a:graphicFrameLocks noGrp="1"/>
-          </p:cNvGraphicFramePr>
-          <p:nvPr>
-            <p:ph idx="1"/>
-            <p:extLst>
-              <p:ext uri="{D42A27DB-BD31-4B8C-83A1-F6EECF244321}">
-                <p14:modId xmlns:p14="http://schemas.microsoft.com/office/powerpoint/2010/main" val="543150202"/>
-              </p:ext>
-            </p:extLst>
-          </p:nvPr>
-        </p:nvGraphicFramePr>
-        <p:xfrm>
-          <a:off x="457200" y="1600200"/>
-          <a:ext cx="8229600" cy="4525963"/>
-        </p:xfrm>
-        <a:graphic>
-          <a:graphicData uri="http://schemas.openxmlformats.org/drawingml/2006/diagram">
-            <dgm:relIds xmlns:dgm="http://schemas.openxmlformats.org/drawingml/2006/diagram" xmlns:r="http://schemas.openxmlformats.org/officeDocument/2006/relationships" r:dm="rId2" r:lo="rId3" r:qs="rId4" r:cs="rId5"/>
-          </a:graphicData>
-        </a:graphic>
-      </p:graphicFrame>
+      <p:pic>
+        <p:nvPicPr>
+          <p:cNvPr id="1028" name="Picture 4" descr="http://www.decodeunicode.org/data/glyph/196x196/2672.gif"/>
+          <p:cNvPicPr>
+            <a:picLocks noChangeAspect="1" noChangeArrowheads="1"/>
+          </p:cNvPicPr>
+          <p:nvPr/>
+        </p:nvPicPr>
+        <p:blipFill>
+          <a:blip r:embed="rId2">
+            <a:extLst>
+              <a:ext uri="{28A0092B-C50C-407E-A947-70E740481C1C}">
+                <a14:useLocalDpi xmlns:a14="http://schemas.microsoft.com/office/drawing/2010/main" val="0"/>
+              </a:ext>
+            </a:extLst>
+          </a:blip>
+          <a:srcRect/>
+          <a:stretch>
+            <a:fillRect/>
+          </a:stretch>
+        </p:blipFill>
+        <p:spPr bwMode="auto">
+          <a:xfrm>
+            <a:off x="1905000" y="1219200"/>
+            <a:ext cx="5257800" cy="5257803"/>
+          </a:xfrm>
+          <a:prstGeom prst="rect">
+            <a:avLst/>
+          </a:prstGeom>
+          <a:noFill/>
+          <a:extLst>
+            <a:ext uri="{909E8E84-426E-40DD-AFC4-6F175D3DCCD1}">
+              <a14:hiddenFill xmlns:a14="http://schemas.microsoft.com/office/drawing/2010/main">
+                <a:solidFill>
+                  <a:srgbClr val="FFFFFF"/>
+                </a:solidFill>
+              </a14:hiddenFill>
+            </a:ext>
+          </a:extLst>
+        </p:spPr>
+      </p:pic>
+      <p:sp>
+        <p:nvSpPr>
+          <p:cNvPr id="6" name="TextBox 5"/>
+          <p:cNvSpPr txBox="1"/>
+          <p:nvPr/>
+        </p:nvSpPr>
+        <p:spPr>
+          <a:xfrm>
+            <a:off x="3733800" y="1600200"/>
+            <a:ext cx="1627561" cy="523220"/>
+          </a:xfrm>
+          <a:prstGeom prst="rect">
+            <a:avLst/>
+          </a:prstGeom>
+          <a:noFill/>
+        </p:spPr>
+        <p:txBody>
+          <a:bodyPr wrap="none" rtlCol="0">
+            <a:spAutoFit/>
+          </a:bodyPr>
+          <a:lstStyle/>
+          <a:p>
+            <a:r>
+              <a:rPr lang="en-US" sz="2800" dirty="0" smtClean="0"/>
+              <a:t>Write test</a:t>
+            </a:r>
+            <a:endParaRPr lang="en-US" sz="2800" dirty="0"/>
+          </a:p>
+        </p:txBody>
+      </p:sp>
+      <p:sp>
+        <p:nvSpPr>
+          <p:cNvPr id="9" name="TextBox 8"/>
+          <p:cNvSpPr txBox="1"/>
+          <p:nvPr/>
+        </p:nvSpPr>
+        <p:spPr>
+          <a:xfrm rot="17824305">
+            <a:off x="4779384" y="4605905"/>
+            <a:ext cx="3408562" cy="523220"/>
+          </a:xfrm>
+          <a:prstGeom prst="rect">
+            <a:avLst/>
+          </a:prstGeom>
+          <a:noFill/>
+        </p:spPr>
+        <p:txBody>
+          <a:bodyPr wrap="none" rtlCol="0">
+            <a:spAutoFit/>
+          </a:bodyPr>
+          <a:lstStyle/>
+          <a:p>
+            <a:r>
+              <a:rPr lang="en-US" sz="2800" dirty="0" smtClean="0"/>
+              <a:t>Write implementation</a:t>
+            </a:r>
+            <a:endParaRPr lang="en-US" sz="2800" dirty="0"/>
+          </a:p>
+        </p:txBody>
+      </p:sp>
+      <p:sp>
+        <p:nvSpPr>
+          <p:cNvPr id="10" name="TextBox 9"/>
+          <p:cNvSpPr txBox="1"/>
+          <p:nvPr/>
+        </p:nvSpPr>
+        <p:spPr>
+          <a:xfrm rot="3646701">
+            <a:off x="1990851" y="4679721"/>
+            <a:ext cx="1487202" cy="523220"/>
+          </a:xfrm>
+          <a:prstGeom prst="rect">
+            <a:avLst/>
+          </a:prstGeom>
+          <a:noFill/>
+        </p:spPr>
+        <p:txBody>
+          <a:bodyPr wrap="none" rtlCol="0">
+            <a:spAutoFit/>
+          </a:bodyPr>
+          <a:lstStyle/>
+          <a:p>
+            <a:r>
+              <a:rPr lang="en-US" sz="2800" dirty="0" smtClean="0"/>
+              <a:t>Test pass</a:t>
+            </a:r>
+            <a:endParaRPr lang="en-US" sz="2800" dirty="0"/>
+          </a:p>
+        </p:txBody>
+      </p:sp>
     </p:spTree>
     <p:extLst>
       <p:ext uri="{BB962C8B-B14F-4D97-AF65-F5344CB8AC3E}">

</xml_diff>